<commit_message>
card details updated, testing report updated
</commit_message>
<xml_diff>
--- a/testing/report.pptx
+++ b/testing/report.pptx
@@ -8,8 +8,11 @@
     <p:sldId id="256" r:id="rId2"/>
     <p:sldId id="257" r:id="rId3"/>
     <p:sldId id="259" r:id="rId4"/>
-    <p:sldId id="258" r:id="rId5"/>
-    <p:sldId id="260" r:id="rId6"/>
+    <p:sldId id="261" r:id="rId5"/>
+    <p:sldId id="258" r:id="rId6"/>
+    <p:sldId id="262" r:id="rId7"/>
+    <p:sldId id="263" r:id="rId8"/>
+    <p:sldId id="260" r:id="rId9"/>
   </p:sldIdLst>
   <p:sldSz cx="12192000" cy="6858000"/>
   <p:notesSz cx="6858000" cy="9144000"/>
@@ -338,7 +341,7 @@
             <a:fld id="{08B9EBBA-996F-894A-B54A-D6246ED52CEA}" type="datetimeFigureOut">
               <a:rPr lang="en-US" smtClean="0"/>
               <a:pPr/>
-              <a:t>08-Mar-21</a:t>
+              <a:t>3/9/2021</a:t>
             </a:fld>
             <a:endParaRPr lang="en-US" dirty="0"/>
           </a:p>
@@ -428,7 +431,7 @@
     </p:spTree>
     <p:extLst>
       <p:ext uri="{BB962C8B-B14F-4D97-AF65-F5344CB8AC3E}">
-        <p14:creationId xmlns:p14="http://schemas.microsoft.com/office/powerpoint/2010/main" val="674114605"/>
+        <p14:creationId xmlns="" xmlns:p14="http://schemas.microsoft.com/office/powerpoint/2010/main" val="674114605"/>
       </p:ext>
     </p:extLst>
   </p:cSld>
@@ -548,7 +551,7 @@
             <a:fld id="{C6C52C72-DE31-F449-A4ED-4C594FD91407}" type="datetimeFigureOut">
               <a:rPr lang="en-US" smtClean="0"/>
               <a:pPr/>
-              <a:t>08-Mar-21</a:t>
+              <a:t>3/9/2021</a:t>
             </a:fld>
             <a:endParaRPr lang="en-US" dirty="0"/>
           </a:p>
@@ -600,7 +603,7 @@
     </p:spTree>
     <p:extLst>
       <p:ext uri="{BB962C8B-B14F-4D97-AF65-F5344CB8AC3E}">
-        <p14:creationId xmlns:p14="http://schemas.microsoft.com/office/powerpoint/2010/main" val="206602018"/>
+        <p14:creationId xmlns="" xmlns:p14="http://schemas.microsoft.com/office/powerpoint/2010/main" val="206602018"/>
       </p:ext>
     </p:extLst>
   </p:cSld>
@@ -806,7 +809,7 @@
             <a:fld id="{ED62726E-379B-B349-9EED-81ED093FA806}" type="datetimeFigureOut">
               <a:rPr lang="en-US" smtClean="0"/>
               <a:pPr/>
-              <a:t>08-Mar-21</a:t>
+              <a:t>3/9/2021</a:t>
             </a:fld>
             <a:endParaRPr lang="en-US" dirty="0"/>
           </a:p>
@@ -858,7 +861,7 @@
     </p:spTree>
     <p:extLst>
       <p:ext uri="{BB962C8B-B14F-4D97-AF65-F5344CB8AC3E}">
-        <p14:creationId xmlns:p14="http://schemas.microsoft.com/office/powerpoint/2010/main" val="2250264604"/>
+        <p14:creationId xmlns="" xmlns:p14="http://schemas.microsoft.com/office/powerpoint/2010/main" val="2250264604"/>
       </p:ext>
     </p:extLst>
   </p:cSld>
@@ -978,7 +981,7 @@
             <a:fld id="{9B3A1323-8D79-1946-B0D7-40001CF92E9D}" type="datetimeFigureOut">
               <a:rPr lang="en-US" smtClean="0"/>
               <a:pPr/>
-              <a:t>08-Mar-21</a:t>
+              <a:t>3/9/2021</a:t>
             </a:fld>
             <a:endParaRPr lang="en-US" dirty="0"/>
           </a:p>
@@ -1030,7 +1033,7 @@
     </p:spTree>
     <p:extLst>
       <p:ext uri="{BB962C8B-B14F-4D97-AF65-F5344CB8AC3E}">
-        <p14:creationId xmlns:p14="http://schemas.microsoft.com/office/powerpoint/2010/main" val="793780344"/>
+        <p14:creationId xmlns="" xmlns:p14="http://schemas.microsoft.com/office/powerpoint/2010/main" val="793780344"/>
       </p:ext>
     </p:extLst>
   </p:cSld>
@@ -1323,7 +1326,7 @@
             <a:fld id="{8DFA1846-DA80-1C48-A609-854EA85C59AD}" type="datetimeFigureOut">
               <a:rPr lang="en-US" smtClean="0"/>
               <a:pPr/>
-              <a:t>08-Mar-21</a:t>
+              <a:t>3/9/2021</a:t>
             </a:fld>
             <a:endParaRPr lang="en-US" dirty="0"/>
           </a:p>
@@ -1413,7 +1416,7 @@
     </p:spTree>
     <p:extLst>
       <p:ext uri="{BB962C8B-B14F-4D97-AF65-F5344CB8AC3E}">
-        <p14:creationId xmlns:p14="http://schemas.microsoft.com/office/powerpoint/2010/main" val="2743090960"/>
+        <p14:creationId xmlns="" xmlns:p14="http://schemas.microsoft.com/office/powerpoint/2010/main" val="2743090960"/>
       </p:ext>
     </p:extLst>
   </p:cSld>
@@ -1600,7 +1603,7 @@
             <a:fld id="{57302355-E14B-8545-A8F8-0FE83CC9D524}" type="datetimeFigureOut">
               <a:rPr lang="en-US" smtClean="0"/>
               <a:pPr/>
-              <a:t>08-Mar-21</a:t>
+              <a:t>3/9/2021</a:t>
             </a:fld>
             <a:endParaRPr lang="en-US" dirty="0"/>
           </a:p>
@@ -1652,7 +1655,7 @@
     </p:spTree>
     <p:extLst>
       <p:ext uri="{BB962C8B-B14F-4D97-AF65-F5344CB8AC3E}">
-        <p14:creationId xmlns:p14="http://schemas.microsoft.com/office/powerpoint/2010/main" val="466501166"/>
+        <p14:creationId xmlns="" xmlns:p14="http://schemas.microsoft.com/office/powerpoint/2010/main" val="466501166"/>
       </p:ext>
     </p:extLst>
   </p:cSld>
@@ -1981,7 +1984,7 @@
             <a:fld id="{02640F58-564D-2B4F-AE67-E407BA4FCF45}" type="datetimeFigureOut">
               <a:rPr lang="en-US" smtClean="0"/>
               <a:pPr/>
-              <a:t>08-Mar-21</a:t>
+              <a:t>3/9/2021</a:t>
             </a:fld>
             <a:endParaRPr lang="en-US" dirty="0"/>
           </a:p>
@@ -2033,7 +2036,7 @@
     </p:spTree>
     <p:extLst>
       <p:ext uri="{BB962C8B-B14F-4D97-AF65-F5344CB8AC3E}">
-        <p14:creationId xmlns:p14="http://schemas.microsoft.com/office/powerpoint/2010/main" val="1828884240"/>
+        <p14:creationId xmlns="" xmlns:p14="http://schemas.microsoft.com/office/powerpoint/2010/main" val="1828884240"/>
       </p:ext>
     </p:extLst>
   </p:cSld>
@@ -2101,7 +2104,7 @@
             <a:fld id="{F13A34C8-038E-2045-AF43-DF7DBB8E0E9E}" type="datetimeFigureOut">
               <a:rPr lang="en-US" smtClean="0"/>
               <a:pPr/>
-              <a:t>08-Mar-21</a:t>
+              <a:t>3/9/2021</a:t>
             </a:fld>
             <a:endParaRPr lang="en-US" dirty="0"/>
           </a:p>
@@ -2153,7 +2156,7 @@
     </p:spTree>
     <p:extLst>
       <p:ext uri="{BB962C8B-B14F-4D97-AF65-F5344CB8AC3E}">
-        <p14:creationId xmlns:p14="http://schemas.microsoft.com/office/powerpoint/2010/main" val="2863392592"/>
+        <p14:creationId xmlns="" xmlns:p14="http://schemas.microsoft.com/office/powerpoint/2010/main" val="2863392592"/>
       </p:ext>
     </p:extLst>
   </p:cSld>
@@ -2274,7 +2277,7 @@
             <a:fld id="{8818C68F-D26B-8F47-958C-23B49CF8A634}" type="datetimeFigureOut">
               <a:rPr lang="en-US" smtClean="0"/>
               <a:pPr/>
-              <a:t>08-Mar-21</a:t>
+              <a:t>3/9/2021</a:t>
             </a:fld>
             <a:endParaRPr lang="en-US" dirty="0"/>
           </a:p>
@@ -2334,7 +2337,7 @@
     </p:spTree>
     <p:extLst>
       <p:ext uri="{BB962C8B-B14F-4D97-AF65-F5344CB8AC3E}">
-        <p14:creationId xmlns:p14="http://schemas.microsoft.com/office/powerpoint/2010/main" val="1110544463"/>
+        <p14:creationId xmlns="" xmlns:p14="http://schemas.microsoft.com/office/powerpoint/2010/main" val="1110544463"/>
       </p:ext>
     </p:extLst>
   </p:cSld>
@@ -2630,7 +2633,7 @@
             <a:fld id="{D0DF5E60-9974-AC48-9591-99C2BB44B7CF}" type="datetimeFigureOut">
               <a:rPr lang="en-US" smtClean="0"/>
               <a:pPr/>
-              <a:t>08-Mar-21</a:t>
+              <a:t>3/9/2021</a:t>
             </a:fld>
             <a:endParaRPr lang="en-US" dirty="0"/>
           </a:p>
@@ -2703,7 +2706,7 @@
     </p:spTree>
     <p:extLst>
       <p:ext uri="{BB962C8B-B14F-4D97-AF65-F5344CB8AC3E}">
-        <p14:creationId xmlns:p14="http://schemas.microsoft.com/office/powerpoint/2010/main" val="1281305001"/>
+        <p14:creationId xmlns="" xmlns:p14="http://schemas.microsoft.com/office/powerpoint/2010/main" val="1281305001"/>
       </p:ext>
     </p:extLst>
   </p:cSld>
@@ -3009,7 +3012,7 @@
             <a:fld id="{09B482E8-6E0E-1B4F-B1FD-C69DB9E858D9}" type="datetimeFigureOut">
               <a:rPr lang="en-US" smtClean="0"/>
               <a:pPr/>
-              <a:t>08-Mar-21</a:t>
+              <a:t>3/9/2021</a:t>
             </a:fld>
             <a:endParaRPr lang="en-US" dirty="0"/>
           </a:p>
@@ -3061,7 +3064,7 @@
     </p:spTree>
     <p:extLst>
       <p:ext uri="{BB962C8B-B14F-4D97-AF65-F5344CB8AC3E}">
-        <p14:creationId xmlns:p14="http://schemas.microsoft.com/office/powerpoint/2010/main" val="2722369934"/>
+        <p14:creationId xmlns="" xmlns:p14="http://schemas.microsoft.com/office/powerpoint/2010/main" val="2722369934"/>
       </p:ext>
     </p:extLst>
   </p:cSld>
@@ -3299,7 +3302,7 @@
             <a:fld id="{09B482E8-6E0E-1B4F-B1FD-C69DB9E858D9}" type="datetimeFigureOut">
               <a:rPr lang="en-US" smtClean="0"/>
               <a:pPr/>
-              <a:t>08-Mar-21</a:t>
+              <a:t>3/9/2021</a:t>
             </a:fld>
             <a:endParaRPr lang="en-US" dirty="0"/>
           </a:p>
@@ -3421,7 +3424,7 @@
     </p:spTree>
     <p:extLst>
       <p:ext uri="{BB962C8B-B14F-4D97-AF65-F5344CB8AC3E}">
-        <p14:creationId xmlns:p14="http://schemas.microsoft.com/office/powerpoint/2010/main" val="1322320803"/>
+        <p14:creationId xmlns="" xmlns:p14="http://schemas.microsoft.com/office/powerpoint/2010/main" val="1322320803"/>
       </p:ext>
     </p:extLst>
   </p:cSld>
@@ -3838,7 +3841,7 @@
           <p:cNvPr id="2" name="Title 1">
             <a:extLst>
               <a:ext uri="{FF2B5EF4-FFF2-40B4-BE49-F238E27FC236}">
-                <a16:creationId xmlns:a16="http://schemas.microsoft.com/office/drawing/2014/main" id="{433B50DB-F782-447E-B464-B05047F0E22E}"/>
+                <a16:creationId xmlns="" xmlns:a16="http://schemas.microsoft.com/office/drawing/2014/main" id="{433B50DB-F782-447E-B464-B05047F0E22E}"/>
               </a:ext>
             </a:extLst>
           </p:cNvPr>
@@ -3849,9 +3852,16 @@
             <p:ph type="ctrTitle"/>
           </p:nvPr>
         </p:nvSpPr>
-        <p:spPr/>
-        <p:txBody>
-          <a:bodyPr/>
+        <p:spPr>
+          <a:xfrm>
+            <a:off x="1097280" y="3237186"/>
+            <a:ext cx="10058400" cy="1087926"/>
+          </a:xfrm>
+        </p:spPr>
+        <p:txBody>
+          <a:bodyPr>
+            <a:normAutofit fontScale="90000"/>
+          </a:bodyPr>
           <a:lstStyle/>
           <a:p>
             <a:r>
@@ -3866,7 +3876,7 @@
           <p:cNvPr id="3" name="Subtitle 2">
             <a:extLst>
               <a:ext uri="{FF2B5EF4-FFF2-40B4-BE49-F238E27FC236}">
-                <a16:creationId xmlns:a16="http://schemas.microsoft.com/office/drawing/2014/main" id="{456D53DC-B705-4EAD-BE7B-2EFDAEF14215}"/>
+                <a16:creationId xmlns="" xmlns:a16="http://schemas.microsoft.com/office/drawing/2014/main" id="{456D53DC-B705-4EAD-BE7B-2EFDAEF14215}"/>
               </a:ext>
             </a:extLst>
           </p:cNvPr>
@@ -3877,7 +3887,12 @@
             <p:ph type="subTitle" idx="1"/>
           </p:nvPr>
         </p:nvSpPr>
-        <p:spPr/>
+        <p:spPr>
+          <a:xfrm>
+            <a:off x="1100051" y="5096752"/>
+            <a:ext cx="10058400" cy="1143000"/>
+          </a:xfrm>
+        </p:spPr>
         <p:txBody>
           <a:bodyPr/>
           <a:lstStyle/>
@@ -3886,13 +3901,64 @@
               <a:rPr lang="en-US" dirty="0"/>
               <a:t>Abhijit Roy</a:t>
             </a:r>
+          </a:p>
+        </p:txBody>
+      </p:sp>
+      <p:sp>
+        <p:nvSpPr>
+          <p:cNvPr id="4" name="TextBox 3"/>
+          <p:cNvSpPr txBox="1"/>
+          <p:nvPr/>
+        </p:nvSpPr>
+        <p:spPr>
+          <a:xfrm>
+            <a:off x="1219200" y="4361796"/>
+            <a:ext cx="1656992" cy="400110"/>
+          </a:xfrm>
+          <a:prstGeom prst="rect">
+            <a:avLst/>
+          </a:prstGeom>
+          <a:solidFill>
+            <a:schemeClr val="accent4"/>
+          </a:solidFill>
+          <a:effectLst>
+            <a:outerShdw blurRad="50800" dist="38100" dir="2700000" algn="tl" rotWithShape="0">
+              <a:prstClr val="black">
+                <a:alpha val="40000"/>
+              </a:prstClr>
+            </a:outerShdw>
+          </a:effectLst>
+        </p:spPr>
+        <p:txBody>
+          <a:bodyPr wrap="none" rtlCol="0">
+            <a:spAutoFit/>
+          </a:bodyPr>
+          <a:lstStyle/>
+          <a:p>
+            <a:r>
+              <a:rPr lang="en-IN" sz="2000" dirty="0" smtClean="0">
+                <a:solidFill>
+                  <a:schemeClr val="bg1"/>
+                </a:solidFill>
+                <a:latin typeface="Calibri Light" pitchFamily="34" charset="0"/>
+                <a:cs typeface="Calibri Light" pitchFamily="34" charset="0"/>
+              </a:rPr>
+              <a:t>Testing Report</a:t>
+            </a:r>
+            <a:endParaRPr lang="en-US" sz="2000" dirty="0">
+              <a:solidFill>
+                <a:schemeClr val="bg1"/>
+              </a:solidFill>
+              <a:latin typeface="Calibri Light" pitchFamily="34" charset="0"/>
+              <a:cs typeface="Calibri Light" pitchFamily="34" charset="0"/>
+            </a:endParaRPr>
           </a:p>
         </p:txBody>
       </p:sp>
     </p:spTree>
     <p:extLst>
       <p:ext uri="{BB962C8B-B14F-4D97-AF65-F5344CB8AC3E}">
-        <p14:creationId xmlns:p14="http://schemas.microsoft.com/office/powerpoint/2010/main" val="1316566046"/>
+        <p14:creationId xmlns="" xmlns:p14="http://schemas.microsoft.com/office/powerpoint/2010/main" val="1316566046"/>
       </p:ext>
     </p:extLst>
   </p:cSld>
@@ -3924,7 +3990,7 @@
           <p:cNvPr id="2" name="Title 1">
             <a:extLst>
               <a:ext uri="{FF2B5EF4-FFF2-40B4-BE49-F238E27FC236}">
-                <a16:creationId xmlns:a16="http://schemas.microsoft.com/office/drawing/2014/main" id="{E070ED99-BFEC-4CD6-A6DE-532D74485DE6}"/>
+                <a16:creationId xmlns="" xmlns:a16="http://schemas.microsoft.com/office/drawing/2014/main" id="{E070ED99-BFEC-4CD6-A6DE-532D74485DE6}"/>
               </a:ext>
             </a:extLst>
           </p:cNvPr>
@@ -3952,7 +4018,7 @@
           <p:cNvPr id="3" name="Content Placeholder 2">
             <a:extLst>
               <a:ext uri="{FF2B5EF4-FFF2-40B4-BE49-F238E27FC236}">
-                <a16:creationId xmlns:a16="http://schemas.microsoft.com/office/drawing/2014/main" id="{80D87DB9-FC06-4AC8-A06C-F9BFF0DA18B2}"/>
+                <a16:creationId xmlns="" xmlns:a16="http://schemas.microsoft.com/office/drawing/2014/main" id="{80D87DB9-FC06-4AC8-A06C-F9BFF0DA18B2}"/>
               </a:ext>
             </a:extLst>
           </p:cNvPr>
@@ -4081,7 +4147,7 @@
     </p:spTree>
     <p:extLst>
       <p:ext uri="{BB962C8B-B14F-4D97-AF65-F5344CB8AC3E}">
-        <p14:creationId xmlns:p14="http://schemas.microsoft.com/office/powerpoint/2010/main" val="686945773"/>
+        <p14:creationId xmlns="" xmlns:p14="http://schemas.microsoft.com/office/powerpoint/2010/main" val="686945773"/>
       </p:ext>
     </p:extLst>
   </p:cSld>
@@ -4113,7 +4179,7 @@
           <p:cNvPr id="2" name="Title 1">
             <a:extLst>
               <a:ext uri="{FF2B5EF4-FFF2-40B4-BE49-F238E27FC236}">
-                <a16:creationId xmlns:a16="http://schemas.microsoft.com/office/drawing/2014/main" id="{98DB85A8-ABB9-45CC-A155-6FA9AFD624C1}"/>
+                <a16:creationId xmlns="" xmlns:a16="http://schemas.microsoft.com/office/drawing/2014/main" id="{98DB85A8-ABB9-45CC-A155-6FA9AFD624C1}"/>
               </a:ext>
             </a:extLst>
           </p:cNvPr>
@@ -4148,7 +4214,7 @@
     </p:spTree>
     <p:extLst>
       <p:ext uri="{BB962C8B-B14F-4D97-AF65-F5344CB8AC3E}">
-        <p14:creationId xmlns:p14="http://schemas.microsoft.com/office/powerpoint/2010/main" val="600878486"/>
+        <p14:creationId xmlns="" xmlns:p14="http://schemas.microsoft.com/office/powerpoint/2010/main" val="600878486"/>
       </p:ext>
     </p:extLst>
   </p:cSld>
@@ -4175,24 +4241,2306 @@
           <a:chExt cx="0" cy="0"/>
         </a:xfrm>
       </p:grpSpPr>
-      <p:grpSp>
-        <p:nvGrpSpPr>
-          <p:cNvPr id="11" name="Group 10">
+      <p:sp>
+        <p:nvSpPr>
+          <p:cNvPr id="6" name="TextBox 5"/>
+          <p:cNvSpPr txBox="1"/>
+          <p:nvPr/>
+        </p:nvSpPr>
+        <p:spPr>
+          <a:xfrm>
+            <a:off x="388885" y="1137970"/>
+            <a:ext cx="5129048" cy="369332"/>
+          </a:xfrm>
+          <a:prstGeom prst="rect">
+            <a:avLst/>
+          </a:prstGeom>
+          <a:solidFill>
+            <a:schemeClr val="accent6">
+              <a:lumMod val="50000"/>
+            </a:schemeClr>
+          </a:solidFill>
+        </p:spPr>
+        <p:txBody>
+          <a:bodyPr wrap="square" rtlCol="0">
+            <a:spAutoFit/>
+          </a:bodyPr>
+          <a:lstStyle/>
+          <a:p>
+            <a:pPr algn="ctr"/>
+            <a:r>
+              <a:rPr lang="en-IN" dirty="0" smtClean="0">
+                <a:solidFill>
+                  <a:schemeClr val="bg1"/>
+                </a:solidFill>
+              </a:rPr>
+              <a:t>transfer desired cards to escrow contract</a:t>
+            </a:r>
+          </a:p>
+        </p:txBody>
+      </p:sp>
+      <p:sp>
+        <p:nvSpPr>
+          <p:cNvPr id="7" name="TextBox 6"/>
+          <p:cNvSpPr txBox="1"/>
+          <p:nvPr/>
+        </p:nvSpPr>
+        <p:spPr>
+          <a:xfrm>
+            <a:off x="1770999" y="2152218"/>
+            <a:ext cx="2338552" cy="369332"/>
+          </a:xfrm>
+          <a:prstGeom prst="rect">
+            <a:avLst/>
+          </a:prstGeom>
+          <a:solidFill>
+            <a:schemeClr val="accent6">
+              <a:lumMod val="50000"/>
+            </a:schemeClr>
+          </a:solidFill>
+        </p:spPr>
+        <p:txBody>
+          <a:bodyPr wrap="square" rtlCol="0">
+            <a:spAutoFit/>
+          </a:bodyPr>
+          <a:lstStyle/>
+          <a:p>
+            <a:r>
+              <a:rPr lang="en-IN" dirty="0" smtClean="0">
+                <a:solidFill>
+                  <a:schemeClr val="bg1"/>
+                </a:solidFill>
+              </a:rPr>
+              <a:t>Select cards for playing</a:t>
+            </a:r>
+          </a:p>
+        </p:txBody>
+      </p:sp>
+      <p:sp>
+        <p:nvSpPr>
+          <p:cNvPr id="8" name="TextBox 7"/>
+          <p:cNvSpPr txBox="1"/>
+          <p:nvPr/>
+        </p:nvSpPr>
+        <p:spPr>
+          <a:xfrm>
+            <a:off x="2219788" y="3009306"/>
+            <a:ext cx="1454199" cy="369332"/>
+          </a:xfrm>
+          <a:prstGeom prst="rect">
+            <a:avLst/>
+          </a:prstGeom>
+          <a:solidFill>
+            <a:schemeClr val="accent6">
+              <a:lumMod val="50000"/>
+            </a:schemeClr>
+          </a:solidFill>
+        </p:spPr>
+        <p:txBody>
+          <a:bodyPr wrap="square" rtlCol="0">
+            <a:spAutoFit/>
+          </a:bodyPr>
+          <a:lstStyle/>
+          <a:p>
+            <a:pPr algn="ctr"/>
+            <a:r>
+              <a:rPr lang="en-IN" dirty="0" smtClean="0">
+                <a:solidFill>
+                  <a:schemeClr val="bg1"/>
+                </a:solidFill>
+              </a:rPr>
+              <a:t>play</a:t>
+            </a:r>
+          </a:p>
+        </p:txBody>
+      </p:sp>
+      <p:cxnSp>
+        <p:nvCxnSpPr>
+          <p:cNvPr id="10" name="Straight Arrow Connector 9"/>
+          <p:cNvCxnSpPr>
+            <a:stCxn id="6" idx="2"/>
+            <a:endCxn id="7" idx="0"/>
+          </p:cNvCxnSpPr>
+          <p:nvPr/>
+        </p:nvCxnSpPr>
+        <p:spPr>
+          <a:xfrm flipH="1">
+            <a:off x="2940275" y="1507302"/>
+            <a:ext cx="13134" cy="644916"/>
+          </a:xfrm>
+          <a:prstGeom prst="straightConnector1">
+            <a:avLst/>
+          </a:prstGeom>
+          <a:ln>
+            <a:solidFill>
+              <a:srgbClr val="92D050"/>
+            </a:solidFill>
+            <a:tailEnd type="arrow"/>
+          </a:ln>
+        </p:spPr>
+        <p:style>
+          <a:lnRef idx="2">
+            <a:schemeClr val="accent5"/>
+          </a:lnRef>
+          <a:fillRef idx="0">
+            <a:schemeClr val="accent5"/>
+          </a:fillRef>
+          <a:effectRef idx="1">
+            <a:schemeClr val="accent5"/>
+          </a:effectRef>
+          <a:fontRef idx="minor">
+            <a:schemeClr val="tx1"/>
+          </a:fontRef>
+        </p:style>
+      </p:cxnSp>
+      <p:cxnSp>
+        <p:nvCxnSpPr>
+          <p:cNvPr id="17" name="Straight Arrow Connector 16"/>
+          <p:cNvCxnSpPr>
+            <a:stCxn id="7" idx="2"/>
+            <a:endCxn id="8" idx="0"/>
+          </p:cNvCxnSpPr>
+          <p:nvPr/>
+        </p:nvCxnSpPr>
+        <p:spPr>
+          <a:xfrm>
+            <a:off x="2940275" y="2521550"/>
+            <a:ext cx="6613" cy="487756"/>
+          </a:xfrm>
+          <a:prstGeom prst="straightConnector1">
+            <a:avLst/>
+          </a:prstGeom>
+          <a:ln>
+            <a:solidFill>
+              <a:srgbClr val="92D050"/>
+            </a:solidFill>
+            <a:tailEnd type="arrow"/>
+          </a:ln>
+        </p:spPr>
+        <p:style>
+          <a:lnRef idx="2">
+            <a:schemeClr val="accent5"/>
+          </a:lnRef>
+          <a:fillRef idx="0">
+            <a:schemeClr val="accent5"/>
+          </a:fillRef>
+          <a:effectRef idx="1">
+            <a:schemeClr val="accent5"/>
+          </a:effectRef>
+          <a:fontRef idx="minor">
+            <a:schemeClr val="tx1"/>
+          </a:fontRef>
+        </p:style>
+      </p:cxnSp>
+      <p:cxnSp>
+        <p:nvCxnSpPr>
+          <p:cNvPr id="19" name="Straight Arrow Connector 18"/>
+          <p:cNvCxnSpPr/>
+          <p:nvPr/>
+        </p:nvCxnSpPr>
+        <p:spPr>
+          <a:xfrm>
+            <a:off x="4151590" y="2342875"/>
+            <a:ext cx="956441" cy="3784"/>
+          </a:xfrm>
+          <a:prstGeom prst="straightConnector1">
+            <a:avLst/>
+          </a:prstGeom>
+          <a:ln>
+            <a:solidFill>
+              <a:srgbClr val="FF0000"/>
+            </a:solidFill>
+            <a:tailEnd type="arrow"/>
+          </a:ln>
+        </p:spPr>
+        <p:style>
+          <a:lnRef idx="2">
+            <a:schemeClr val="accent5"/>
+          </a:lnRef>
+          <a:fillRef idx="0">
+            <a:schemeClr val="accent5"/>
+          </a:fillRef>
+          <a:effectRef idx="1">
+            <a:schemeClr val="accent5"/>
+          </a:effectRef>
+          <a:fontRef idx="minor">
+            <a:schemeClr val="tx1"/>
+          </a:fontRef>
+        </p:style>
+      </p:cxnSp>
+      <p:sp>
+        <p:nvSpPr>
+          <p:cNvPr id="22" name="TextBox 21"/>
+          <p:cNvSpPr txBox="1"/>
+          <p:nvPr/>
+        </p:nvSpPr>
+        <p:spPr>
+          <a:xfrm>
+            <a:off x="5108032" y="2167983"/>
+            <a:ext cx="3499288" cy="830997"/>
+          </a:xfrm>
+          <a:prstGeom prst="rect">
+            <a:avLst/>
+          </a:prstGeom>
+          <a:solidFill>
+            <a:srgbClr val="C00000"/>
+          </a:solidFill>
+        </p:spPr>
+        <p:txBody>
+          <a:bodyPr wrap="square" rtlCol="0">
+            <a:spAutoFit/>
+          </a:bodyPr>
+          <a:lstStyle/>
+          <a:p>
+            <a:r>
+              <a:rPr lang="en-IN" sz="1200" b="1" u="sng" dirty="0" smtClean="0">
+                <a:solidFill>
+                  <a:schemeClr val="bg1"/>
+                </a:solidFill>
+              </a:rPr>
+              <a:t>Reason:</a:t>
+            </a:r>
+            <a:r>
+              <a:rPr lang="en-IN" sz="1200" dirty="0" smtClean="0">
+                <a:solidFill>
+                  <a:schemeClr val="bg1"/>
+                </a:solidFill>
+              </a:rPr>
+              <a:t> Ensure `game_fee` in `gfeewallet` table</a:t>
+            </a:r>
+          </a:p>
+          <a:p>
+            <a:r>
+              <a:rPr lang="en-IN" sz="1200" dirty="0" smtClean="0">
+                <a:solidFill>
+                  <a:schemeClr val="bg1"/>
+                </a:solidFill>
+              </a:rPr>
+              <a:t>---------------------------------------------------------------------</a:t>
+            </a:r>
+          </a:p>
+          <a:p>
+            <a:r>
+              <a:rPr lang="en-IN" sz="1200" b="1" u="sng" dirty="0" smtClean="0">
+                <a:solidFill>
+                  <a:schemeClr val="bg1"/>
+                </a:solidFill>
+              </a:rPr>
+              <a:t>Solution:</a:t>
+            </a:r>
+            <a:r>
+              <a:rPr lang="en-IN" sz="1200" dirty="0" smtClean="0">
+                <a:solidFill>
+                  <a:schemeClr val="bg1"/>
+                </a:solidFill>
+              </a:rPr>
+              <a:t> transfer min. required `game_fee` from `eosio.token::accounts` table</a:t>
+            </a:r>
+            <a:endParaRPr lang="en-IN" sz="1200" u="sng" dirty="0" smtClean="0">
+              <a:solidFill>
+                <a:schemeClr val="bg1"/>
+              </a:solidFill>
+            </a:endParaRPr>
+          </a:p>
+        </p:txBody>
+      </p:sp>
+      <p:graphicFrame>
+        <p:nvGraphicFramePr>
+          <p:cNvPr id="23" name="Table 22"/>
+          <p:cNvGraphicFramePr>
+            <a:graphicFrameLocks noGrp="1"/>
+          </p:cNvGraphicFramePr>
+          <p:nvPr/>
+        </p:nvGraphicFramePr>
+        <p:xfrm>
+          <a:off x="8492362" y="3255511"/>
+          <a:ext cx="3436884" cy="741680"/>
+        </p:xfrm>
+        <a:graphic>
+          <a:graphicData uri="http://schemas.openxmlformats.org/drawingml/2006/table">
+            <a:tbl>
+              <a:tblPr firstRow="1" bandRow="1">
+                <a:tableStyleId>{21E4AEA4-8DFA-4A89-87EB-49C32662AFE0}</a:tableStyleId>
+              </a:tblPr>
+              <a:tblGrid>
+                <a:gridCol w="1537826"/>
+                <a:gridCol w="1899058"/>
+              </a:tblGrid>
+              <a:tr h="370840">
+                <a:tc>
+                  <a:txBody>
+                    <a:bodyPr/>
+                    <a:lstStyle/>
+                    <a:p>
+                      <a:r>
+                        <a:rPr lang="en-IN" sz="1200" dirty="0" smtClean="0"/>
+                        <a:t>From Table</a:t>
+                      </a:r>
+                      <a:endParaRPr lang="en-US" sz="1200" dirty="0"/>
+                    </a:p>
+                  </a:txBody>
+                  <a:tcPr/>
+                </a:tc>
+                <a:tc>
+                  <a:txBody>
+                    <a:bodyPr/>
+                    <a:lstStyle/>
+                    <a:p>
+                      <a:r>
+                        <a:rPr lang="en-IN" sz="1200" dirty="0" smtClean="0"/>
+                        <a:t>To Table</a:t>
+                      </a:r>
+                    </a:p>
+                  </a:txBody>
+                  <a:tcPr/>
+                </a:tc>
+              </a:tr>
+              <a:tr h="370840">
+                <a:tc>
+                  <a:txBody>
+                    <a:bodyPr/>
+                    <a:lstStyle/>
+                    <a:p>
+                      <a:r>
+                        <a:rPr lang="en-IN" sz="1200" dirty="0" smtClean="0"/>
+                        <a:t>eosio.token::accounts</a:t>
+                      </a:r>
+                      <a:endParaRPr lang="en-US" sz="1200" dirty="0"/>
+                    </a:p>
+                  </a:txBody>
+                  <a:tcPr/>
+                </a:tc>
+                <a:tc>
+                  <a:txBody>
+                    <a:bodyPr/>
+                    <a:lstStyle/>
+                    <a:p>
+                      <a:r>
+                        <a:rPr lang="en-IN" sz="1200" dirty="0" smtClean="0"/>
+                        <a:t>gpkbattlesco::gfeewallet</a:t>
+                      </a:r>
+                    </a:p>
+                  </a:txBody>
+                  <a:tcPr/>
+                </a:tc>
+              </a:tr>
+            </a:tbl>
+          </a:graphicData>
+        </a:graphic>
+      </p:graphicFrame>
+      <p:cxnSp>
+        <p:nvCxnSpPr>
+          <p:cNvPr id="24" name="Straight Arrow Connector 23"/>
+          <p:cNvCxnSpPr/>
+          <p:nvPr/>
+        </p:nvCxnSpPr>
+        <p:spPr>
+          <a:xfrm>
+            <a:off x="10436777" y="2511040"/>
+            <a:ext cx="10506" cy="747167"/>
+          </a:xfrm>
+          <a:prstGeom prst="straightConnector1">
+            <a:avLst/>
+          </a:prstGeom>
+          <a:ln>
+            <a:solidFill>
+              <a:srgbClr val="92D050"/>
+            </a:solidFill>
+            <a:tailEnd type="arrow"/>
+          </a:ln>
+        </p:spPr>
+        <p:style>
+          <a:lnRef idx="2">
+            <a:schemeClr val="accent5"/>
+          </a:lnRef>
+          <a:fillRef idx="0">
+            <a:schemeClr val="accent5"/>
+          </a:fillRef>
+          <a:effectRef idx="1">
+            <a:schemeClr val="accent5"/>
+          </a:effectRef>
+          <a:fontRef idx="minor">
+            <a:schemeClr val="tx1"/>
+          </a:fontRef>
+        </p:style>
+      </p:cxnSp>
+      <p:cxnSp>
+        <p:nvCxnSpPr>
+          <p:cNvPr id="26" name="Straight Connector 25"/>
+          <p:cNvCxnSpPr/>
+          <p:nvPr/>
+        </p:nvCxnSpPr>
+        <p:spPr>
+          <a:xfrm>
+            <a:off x="8600970" y="2504752"/>
+            <a:ext cx="1846317" cy="10072"/>
+          </a:xfrm>
+          <a:prstGeom prst="line">
+            <a:avLst/>
+          </a:prstGeom>
+        </p:spPr>
+        <p:style>
+          <a:lnRef idx="1">
+            <a:schemeClr val="accent1"/>
+          </a:lnRef>
+          <a:fillRef idx="0">
+            <a:schemeClr val="accent1"/>
+          </a:fillRef>
+          <a:effectRef idx="0">
+            <a:schemeClr val="accent1"/>
+          </a:effectRef>
+          <a:fontRef idx="minor">
+            <a:schemeClr val="tx1"/>
+          </a:fontRef>
+        </p:style>
+      </p:cxnSp>
+      <p:sp>
+        <p:nvSpPr>
+          <p:cNvPr id="35" name="TextBox 34"/>
+          <p:cNvSpPr txBox="1"/>
+          <p:nvPr/>
+        </p:nvSpPr>
+        <p:spPr>
+          <a:xfrm>
+            <a:off x="8688349" y="2230921"/>
+            <a:ext cx="2251642" cy="276999"/>
+          </a:xfrm>
+          <a:prstGeom prst="rect">
+            <a:avLst/>
+          </a:prstGeom>
+          <a:noFill/>
+        </p:spPr>
+        <p:txBody>
+          <a:bodyPr wrap="none" rtlCol="0">
+            <a:spAutoFit/>
+          </a:bodyPr>
+          <a:lstStyle/>
+          <a:p>
+            <a:r>
+              <a:rPr lang="en-IN" sz="1200" dirty="0" smtClean="0"/>
+              <a:t>ACTION -&gt; `eosio.token::transfer`</a:t>
+            </a:r>
+            <a:endParaRPr lang="en-US" sz="1200" dirty="0"/>
+          </a:p>
+        </p:txBody>
+      </p:sp>
+      <p:sp>
+        <p:nvSpPr>
+          <p:cNvPr id="36" name="TextBox 35"/>
+          <p:cNvSpPr txBox="1"/>
+          <p:nvPr/>
+        </p:nvSpPr>
+        <p:spPr>
+          <a:xfrm>
+            <a:off x="559213" y="2620486"/>
+            <a:ext cx="2354491" cy="276999"/>
+          </a:xfrm>
+          <a:prstGeom prst="rect">
+            <a:avLst/>
+          </a:prstGeom>
+          <a:noFill/>
+        </p:spPr>
+        <p:txBody>
+          <a:bodyPr wrap="none" rtlCol="0">
+            <a:spAutoFit/>
+          </a:bodyPr>
+          <a:lstStyle/>
+          <a:p>
+            <a:pPr algn="r"/>
+            <a:r>
+              <a:rPr lang="en-IN" sz="1200" dirty="0" smtClean="0"/>
+              <a:t>ACTION -&gt; `gpkbattlesco::sel3card`</a:t>
+            </a:r>
+            <a:endParaRPr lang="en-US" sz="1200" dirty="0"/>
+          </a:p>
+        </p:txBody>
+      </p:sp>
+      <p:sp>
+        <p:nvSpPr>
+          <p:cNvPr id="37" name="TextBox 36"/>
+          <p:cNvSpPr txBox="1"/>
+          <p:nvPr/>
+        </p:nvSpPr>
+        <p:spPr>
+          <a:xfrm>
+            <a:off x="561754" y="1695883"/>
+            <a:ext cx="2321469" cy="276999"/>
+          </a:xfrm>
+          <a:prstGeom prst="rect">
+            <a:avLst/>
+          </a:prstGeom>
+          <a:noFill/>
+        </p:spPr>
+        <p:txBody>
+          <a:bodyPr wrap="none" rtlCol="0">
+            <a:spAutoFit/>
+          </a:bodyPr>
+          <a:lstStyle/>
+          <a:p>
+            <a:pPr algn="r"/>
+            <a:r>
+              <a:rPr lang="en-IN" sz="1200" dirty="0" smtClean="0"/>
+              <a:t>ACTION -&gt; `simpleassets::transfer`</a:t>
+            </a:r>
+            <a:endParaRPr lang="en-US" sz="1200" dirty="0"/>
+          </a:p>
+        </p:txBody>
+      </p:sp>
+      <p:sp>
+        <p:nvSpPr>
+          <p:cNvPr id="38" name="Title 1">
             <a:extLst>
               <a:ext uri="{FF2B5EF4-FFF2-40B4-BE49-F238E27FC236}">
-                <a16:creationId xmlns:a16="http://schemas.microsoft.com/office/drawing/2014/main" id="{357D3014-43D3-4585-B7ED-4968E6F802F4}"/>
+                <a16:creationId xmlns="" xmlns:a16="http://schemas.microsoft.com/office/drawing/2014/main" id="{98DB85A8-ABB9-45CC-A155-6FA9AFD624C1}"/>
               </a:ext>
             </a:extLst>
           </p:cNvPr>
+          <p:cNvSpPr txBox="1">
+            <a:spLocks/>
+          </p:cNvSpPr>
+          <p:nvPr/>
+        </p:nvSpPr>
+        <p:spPr>
+          <a:xfrm>
+            <a:off x="0" y="31530"/>
+            <a:ext cx="12191999" cy="867349"/>
+          </a:xfrm>
+          <a:prstGeom prst="rect">
+            <a:avLst/>
+          </a:prstGeom>
+        </p:spPr>
+        <p:style>
+          <a:lnRef idx="2">
+            <a:schemeClr val="accent5"/>
+          </a:lnRef>
+          <a:fillRef idx="1">
+            <a:schemeClr val="lt1"/>
+          </a:fillRef>
+          <a:effectRef idx="0">
+            <a:schemeClr val="accent5"/>
+          </a:effectRef>
+          <a:fontRef idx="minor">
+            <a:schemeClr val="dk1"/>
+          </a:fontRef>
+        </p:style>
+        <p:txBody>
+          <a:bodyPr/>
+          <a:lstStyle/>
+          <a:p>
+            <a:pPr marL="0" marR="0" lvl="0" indent="0" algn="ctr" defTabSz="914400" rtl="0" eaLnBrk="1" fontAlgn="auto" latinLnBrk="0" hangingPunct="1">
+              <a:lnSpc>
+                <a:spcPct val="85000"/>
+              </a:lnSpc>
+              <a:spcBef>
+                <a:spcPct val="0"/>
+              </a:spcBef>
+              <a:spcAft>
+                <a:spcPts val="0"/>
+              </a:spcAft>
+              <a:buClrTx/>
+              <a:buSzTx/>
+              <a:buFontTx/>
+              <a:buNone/>
+              <a:tabLst/>
+              <a:defRPr/>
+            </a:pPr>
+            <a:r>
+              <a:rPr kumimoji="0" lang="en-US" sz="4800" b="1" i="0" u="none" strike="noStrike" kern="1200" cap="none" spc="-50" normalizeH="0" baseline="0" noProof="0" dirty="0" smtClean="0">
+                <a:ln>
+                  <a:noFill/>
+                </a:ln>
+                <a:solidFill>
+                  <a:schemeClr val="bg1">
+                    <a:lumMod val="50000"/>
+                  </a:schemeClr>
+                </a:solidFill>
+                <a:effectLst/>
+                <a:uLnTx/>
+                <a:uFillTx/>
+                <a:latin typeface="+mj-lt"/>
+                <a:ea typeface="+mj-ea"/>
+                <a:cs typeface="+mj-cs"/>
+              </a:rPr>
+              <a:t>Workflow</a:t>
+            </a:r>
+            <a:endParaRPr kumimoji="0" lang="en-US" sz="4800" b="1" i="0" u="none" strike="noStrike" kern="1200" cap="none" spc="-50" normalizeH="0" baseline="0" noProof="0" dirty="0">
+              <a:ln>
+                <a:noFill/>
+              </a:ln>
+              <a:solidFill>
+                <a:schemeClr val="bg1">
+                  <a:lumMod val="50000"/>
+                </a:schemeClr>
+              </a:solidFill>
+              <a:effectLst/>
+              <a:uLnTx/>
+              <a:uFillTx/>
+              <a:latin typeface="+mj-lt"/>
+              <a:ea typeface="+mj-ea"/>
+              <a:cs typeface="+mj-cs"/>
+            </a:endParaRPr>
+          </a:p>
+        </p:txBody>
+      </p:sp>
+      <p:cxnSp>
+        <p:nvCxnSpPr>
+          <p:cNvPr id="39" name="Straight Arrow Connector 38"/>
+          <p:cNvCxnSpPr/>
+          <p:nvPr/>
+        </p:nvCxnSpPr>
+        <p:spPr>
+          <a:xfrm>
+            <a:off x="2188786" y="3767026"/>
+            <a:ext cx="7876" cy="353029"/>
+          </a:xfrm>
+          <a:prstGeom prst="straightConnector1">
+            <a:avLst/>
+          </a:prstGeom>
+          <a:ln>
+            <a:solidFill>
+              <a:srgbClr val="92D050"/>
+            </a:solidFill>
+            <a:tailEnd type="arrow"/>
+          </a:ln>
+        </p:spPr>
+        <p:style>
+          <a:lnRef idx="2">
+            <a:schemeClr val="accent5"/>
+          </a:lnRef>
+          <a:fillRef idx="0">
+            <a:schemeClr val="accent5"/>
+          </a:fillRef>
+          <a:effectRef idx="1">
+            <a:schemeClr val="accent5"/>
+          </a:effectRef>
+          <a:fontRef idx="minor">
+            <a:schemeClr val="tx1"/>
+          </a:fontRef>
+        </p:style>
+      </p:cxnSp>
+      <p:cxnSp>
+        <p:nvCxnSpPr>
+          <p:cNvPr id="41" name="Straight Connector 40"/>
+          <p:cNvCxnSpPr>
+            <a:stCxn id="8" idx="2"/>
+          </p:cNvCxnSpPr>
+          <p:nvPr/>
+        </p:nvCxnSpPr>
+        <p:spPr>
+          <a:xfrm flipH="1">
+            <a:off x="2942897" y="3378638"/>
+            <a:ext cx="3991" cy="384065"/>
+          </a:xfrm>
+          <a:prstGeom prst="line">
+            <a:avLst/>
+          </a:prstGeom>
+          <a:ln w="19050"/>
+        </p:spPr>
+        <p:style>
+          <a:lnRef idx="1">
+            <a:schemeClr val="accent1"/>
+          </a:lnRef>
+          <a:fillRef idx="0">
+            <a:schemeClr val="accent1"/>
+          </a:fillRef>
+          <a:effectRef idx="0">
+            <a:schemeClr val="accent1"/>
+          </a:effectRef>
+          <a:fontRef idx="minor">
+            <a:schemeClr val="tx1"/>
+          </a:fontRef>
+        </p:style>
+      </p:cxnSp>
+      <p:cxnSp>
+        <p:nvCxnSpPr>
+          <p:cNvPr id="44" name="Straight Connector 43"/>
+          <p:cNvCxnSpPr/>
+          <p:nvPr/>
+        </p:nvCxnSpPr>
+        <p:spPr>
+          <a:xfrm flipV="1">
+            <a:off x="2186152" y="3741683"/>
+            <a:ext cx="2039007" cy="21020"/>
+          </a:xfrm>
+          <a:prstGeom prst="line">
+            <a:avLst/>
+          </a:prstGeom>
+          <a:ln w="19050"/>
+        </p:spPr>
+        <p:style>
+          <a:lnRef idx="1">
+            <a:schemeClr val="accent1"/>
+          </a:lnRef>
+          <a:fillRef idx="0">
+            <a:schemeClr val="accent1"/>
+          </a:fillRef>
+          <a:effectRef idx="0">
+            <a:schemeClr val="accent1"/>
+          </a:effectRef>
+          <a:fontRef idx="minor">
+            <a:schemeClr val="tx1"/>
+          </a:fontRef>
+        </p:style>
+      </p:cxnSp>
+      <p:sp>
+        <p:nvSpPr>
+          <p:cNvPr id="46" name="TextBox 45"/>
+          <p:cNvSpPr txBox="1"/>
+          <p:nvPr/>
+        </p:nvSpPr>
+        <p:spPr>
+          <a:xfrm>
+            <a:off x="932271" y="4107637"/>
+            <a:ext cx="1454199" cy="369332"/>
+          </a:xfrm>
+          <a:prstGeom prst="rect">
+            <a:avLst/>
+          </a:prstGeom>
+          <a:solidFill>
+            <a:schemeClr val="accent6">
+              <a:lumMod val="50000"/>
+            </a:schemeClr>
+          </a:solidFill>
+        </p:spPr>
+        <p:txBody>
+          <a:bodyPr wrap="square" rtlCol="0">
+            <a:spAutoFit/>
+          </a:bodyPr>
+          <a:lstStyle/>
+          <a:p>
+            <a:pPr algn="ctr"/>
+            <a:r>
+              <a:rPr lang="en-IN" dirty="0" smtClean="0">
+                <a:solidFill>
+                  <a:schemeClr val="bg1"/>
+                </a:solidFill>
+              </a:rPr>
+              <a:t>No Draw</a:t>
+            </a:r>
+          </a:p>
+        </p:txBody>
+      </p:sp>
+      <p:sp>
+        <p:nvSpPr>
+          <p:cNvPr id="47" name="TextBox 46"/>
+          <p:cNvSpPr txBox="1"/>
+          <p:nvPr/>
+        </p:nvSpPr>
+        <p:spPr>
+          <a:xfrm>
+            <a:off x="3523071" y="4081362"/>
+            <a:ext cx="1454199" cy="369332"/>
+          </a:xfrm>
+          <a:prstGeom prst="rect">
+            <a:avLst/>
+          </a:prstGeom>
+          <a:solidFill>
+            <a:schemeClr val="accent6">
+              <a:lumMod val="50000"/>
+            </a:schemeClr>
+          </a:solidFill>
+        </p:spPr>
+        <p:txBody>
+          <a:bodyPr wrap="square" rtlCol="0">
+            <a:spAutoFit/>
+          </a:bodyPr>
+          <a:lstStyle/>
+          <a:p>
+            <a:pPr algn="ctr"/>
+            <a:r>
+              <a:rPr lang="en-IN" dirty="0" smtClean="0">
+                <a:solidFill>
+                  <a:schemeClr val="bg1"/>
+                </a:solidFill>
+              </a:rPr>
+              <a:t>1-Draw</a:t>
+            </a:r>
+            <a:endParaRPr lang="en-IN" dirty="0" smtClean="0">
+              <a:solidFill>
+                <a:schemeClr val="bg1"/>
+              </a:solidFill>
+            </a:endParaRPr>
+          </a:p>
+        </p:txBody>
+      </p:sp>
+      <p:sp>
+        <p:nvSpPr>
+          <p:cNvPr id="48" name="TextBox 47"/>
+          <p:cNvSpPr txBox="1"/>
+          <p:nvPr/>
+        </p:nvSpPr>
+        <p:spPr>
+          <a:xfrm>
+            <a:off x="816705" y="3414017"/>
+            <a:ext cx="2088905" cy="276999"/>
+          </a:xfrm>
+          <a:prstGeom prst="rect">
+            <a:avLst/>
+          </a:prstGeom>
+          <a:noFill/>
+        </p:spPr>
+        <p:txBody>
+          <a:bodyPr wrap="none" rtlCol="0">
+            <a:spAutoFit/>
+          </a:bodyPr>
+          <a:lstStyle/>
+          <a:p>
+            <a:pPr algn="r"/>
+            <a:r>
+              <a:rPr lang="en-IN" sz="1200" dirty="0" smtClean="0"/>
+              <a:t>ACTION -&gt; `gpkbattlesco::play`</a:t>
+            </a:r>
+            <a:endParaRPr lang="en-US" sz="1200" dirty="0"/>
+          </a:p>
+        </p:txBody>
+      </p:sp>
+      <p:cxnSp>
+        <p:nvCxnSpPr>
+          <p:cNvPr id="49" name="Straight Arrow Connector 48"/>
+          <p:cNvCxnSpPr>
+            <a:endCxn id="47" idx="0"/>
+          </p:cNvCxnSpPr>
+          <p:nvPr/>
+        </p:nvCxnSpPr>
+        <p:spPr>
+          <a:xfrm>
+            <a:off x="4235669" y="3731172"/>
+            <a:ext cx="14502" cy="350190"/>
+          </a:xfrm>
+          <a:prstGeom prst="straightConnector1">
+            <a:avLst/>
+          </a:prstGeom>
+          <a:ln>
+            <a:solidFill>
+              <a:srgbClr val="92D050"/>
+            </a:solidFill>
+            <a:tailEnd type="arrow"/>
+          </a:ln>
+        </p:spPr>
+        <p:style>
+          <a:lnRef idx="2">
+            <a:schemeClr val="accent5"/>
+          </a:lnRef>
+          <a:fillRef idx="0">
+            <a:schemeClr val="accent5"/>
+          </a:fillRef>
+          <a:effectRef idx="1">
+            <a:schemeClr val="accent5"/>
+          </a:effectRef>
+          <a:fontRef idx="minor">
+            <a:schemeClr val="tx1"/>
+          </a:fontRef>
+        </p:style>
+      </p:cxnSp>
+      <p:sp>
+        <p:nvSpPr>
+          <p:cNvPr id="50" name="TextBox 49"/>
+          <p:cNvSpPr txBox="1"/>
+          <p:nvPr/>
+        </p:nvSpPr>
+        <p:spPr>
+          <a:xfrm>
+            <a:off x="73570" y="4512348"/>
+            <a:ext cx="2081048" cy="461665"/>
+          </a:xfrm>
+          <a:prstGeom prst="rect">
+            <a:avLst/>
+          </a:prstGeom>
+          <a:noFill/>
+        </p:spPr>
+        <p:txBody>
+          <a:bodyPr wrap="square" rtlCol="0">
+            <a:spAutoFit/>
+          </a:bodyPr>
+          <a:lstStyle/>
+          <a:p>
+            <a:pPr algn="r"/>
+            <a:r>
+              <a:rPr lang="en-IN" sz="1200" dirty="0" smtClean="0"/>
+              <a:t>ACTION -&gt; </a:t>
+            </a:r>
+          </a:p>
+          <a:p>
+            <a:pPr algn="r"/>
+            <a:r>
+              <a:rPr lang="en-IN" sz="1200" dirty="0" smtClean="0"/>
+              <a:t>`gpkbattlesco::receiverand`</a:t>
+            </a:r>
+            <a:endParaRPr lang="en-US" sz="1200" dirty="0"/>
+          </a:p>
+        </p:txBody>
+      </p:sp>
+      <p:cxnSp>
+        <p:nvCxnSpPr>
+          <p:cNvPr id="51" name="Straight Arrow Connector 50"/>
+          <p:cNvCxnSpPr/>
+          <p:nvPr/>
+        </p:nvCxnSpPr>
+        <p:spPr>
+          <a:xfrm>
+            <a:off x="2183531" y="4476475"/>
+            <a:ext cx="13131" cy="557980"/>
+          </a:xfrm>
+          <a:prstGeom prst="straightConnector1">
+            <a:avLst/>
+          </a:prstGeom>
+          <a:ln>
+            <a:solidFill>
+              <a:srgbClr val="92D050"/>
+            </a:solidFill>
+            <a:tailEnd type="arrow"/>
+          </a:ln>
+        </p:spPr>
+        <p:style>
+          <a:lnRef idx="2">
+            <a:schemeClr val="accent5"/>
+          </a:lnRef>
+          <a:fillRef idx="0">
+            <a:schemeClr val="accent5"/>
+          </a:fillRef>
+          <a:effectRef idx="1">
+            <a:schemeClr val="accent5"/>
+          </a:effectRef>
+          <a:fontRef idx="minor">
+            <a:schemeClr val="tx1"/>
+          </a:fontRef>
+        </p:style>
+      </p:cxnSp>
+      <p:sp>
+        <p:nvSpPr>
+          <p:cNvPr id="62" name="TextBox 61"/>
+          <p:cNvSpPr txBox="1"/>
+          <p:nvPr/>
+        </p:nvSpPr>
+        <p:spPr>
+          <a:xfrm>
+            <a:off x="54675" y="5037803"/>
+            <a:ext cx="2341689" cy="369332"/>
+          </a:xfrm>
+          <a:prstGeom prst="rect">
+            <a:avLst/>
+          </a:prstGeom>
+          <a:solidFill>
+            <a:schemeClr val="accent6">
+              <a:lumMod val="50000"/>
+            </a:schemeClr>
+          </a:solidFill>
+        </p:spPr>
+        <p:txBody>
+          <a:bodyPr wrap="square" rtlCol="0">
+            <a:spAutoFit/>
+          </a:bodyPr>
+          <a:lstStyle/>
+          <a:p>
+            <a:pPr algn="ctr"/>
+            <a:r>
+              <a:rPr lang="en-IN" dirty="0" smtClean="0">
+                <a:solidFill>
+                  <a:schemeClr val="bg1"/>
+                </a:solidFill>
+              </a:rPr>
+              <a:t>Disburse nodraw cards</a:t>
+            </a:r>
+          </a:p>
+        </p:txBody>
+      </p:sp>
+      <p:cxnSp>
+        <p:nvCxnSpPr>
+          <p:cNvPr id="63" name="Straight Arrow Connector 62"/>
+          <p:cNvCxnSpPr/>
+          <p:nvPr/>
+        </p:nvCxnSpPr>
+        <p:spPr>
+          <a:xfrm flipH="1">
+            <a:off x="2175641" y="5385620"/>
+            <a:ext cx="2636" cy="521194"/>
+          </a:xfrm>
+          <a:prstGeom prst="straightConnector1">
+            <a:avLst/>
+          </a:prstGeom>
+          <a:ln>
+            <a:solidFill>
+              <a:srgbClr val="92D050"/>
+            </a:solidFill>
+            <a:tailEnd type="arrow"/>
+          </a:ln>
+        </p:spPr>
+        <p:style>
+          <a:lnRef idx="2">
+            <a:schemeClr val="accent5"/>
+          </a:lnRef>
+          <a:fillRef idx="0">
+            <a:schemeClr val="accent5"/>
+          </a:fillRef>
+          <a:effectRef idx="1">
+            <a:schemeClr val="accent5"/>
+          </a:effectRef>
+          <a:fontRef idx="minor">
+            <a:schemeClr val="tx1"/>
+          </a:fontRef>
+        </p:style>
+      </p:cxnSp>
+      <p:sp>
+        <p:nvSpPr>
+          <p:cNvPr id="64" name="TextBox 63"/>
+          <p:cNvSpPr txBox="1"/>
+          <p:nvPr/>
+        </p:nvSpPr>
+        <p:spPr>
+          <a:xfrm>
+            <a:off x="73570" y="5421493"/>
+            <a:ext cx="2081048" cy="461665"/>
+          </a:xfrm>
+          <a:prstGeom prst="rect">
+            <a:avLst/>
+          </a:prstGeom>
+          <a:noFill/>
+        </p:spPr>
+        <p:txBody>
+          <a:bodyPr wrap="square" rtlCol="0">
+            <a:spAutoFit/>
+          </a:bodyPr>
+          <a:lstStyle/>
+          <a:p>
+            <a:pPr algn="r"/>
+            <a:r>
+              <a:rPr lang="en-IN" sz="1200" dirty="0" smtClean="0"/>
+              <a:t>ACTION -&gt; </a:t>
+            </a:r>
+          </a:p>
+          <a:p>
+            <a:pPr algn="r"/>
+            <a:r>
+              <a:rPr lang="en-IN" sz="1200" dirty="0" smtClean="0"/>
+              <a:t>`gpkbattlesco::disndcards`</a:t>
+            </a:r>
+            <a:endParaRPr lang="en-US" sz="1200" dirty="0"/>
+          </a:p>
+        </p:txBody>
+      </p:sp>
+      <p:cxnSp>
+        <p:nvCxnSpPr>
+          <p:cNvPr id="65" name="Straight Arrow Connector 64"/>
+          <p:cNvCxnSpPr>
+            <a:stCxn id="8" idx="3"/>
+          </p:cNvCxnSpPr>
+          <p:nvPr/>
+        </p:nvCxnSpPr>
+        <p:spPr>
+          <a:xfrm flipV="1">
+            <a:off x="3673987" y="2740797"/>
+            <a:ext cx="1418278" cy="453175"/>
+          </a:xfrm>
+          <a:prstGeom prst="straightConnector1">
+            <a:avLst/>
+          </a:prstGeom>
+          <a:ln>
+            <a:solidFill>
+              <a:srgbClr val="FF0000"/>
+            </a:solidFill>
+            <a:tailEnd type="arrow"/>
+          </a:ln>
+        </p:spPr>
+        <p:style>
+          <a:lnRef idx="2">
+            <a:schemeClr val="accent5"/>
+          </a:lnRef>
+          <a:fillRef idx="0">
+            <a:schemeClr val="accent5"/>
+          </a:fillRef>
+          <a:effectRef idx="1">
+            <a:schemeClr val="accent5"/>
+          </a:effectRef>
+          <a:fontRef idx="minor">
+            <a:schemeClr val="tx1"/>
+          </a:fontRef>
+        </p:style>
+      </p:cxnSp>
+      <p:sp>
+        <p:nvSpPr>
+          <p:cNvPr id="68" name="TextBox 67"/>
+          <p:cNvSpPr txBox="1"/>
+          <p:nvPr/>
+        </p:nvSpPr>
+        <p:spPr>
+          <a:xfrm>
+            <a:off x="932276" y="5915417"/>
+            <a:ext cx="1454199" cy="369332"/>
+          </a:xfrm>
+          <a:prstGeom prst="rect">
+            <a:avLst/>
+          </a:prstGeom>
+          <a:solidFill>
+            <a:srgbClr val="FF7C80"/>
+          </a:solidFill>
+        </p:spPr>
+        <p:txBody>
+          <a:bodyPr wrap="square" rtlCol="0">
+            <a:spAutoFit/>
+          </a:bodyPr>
+          <a:lstStyle/>
+          <a:p>
+            <a:pPr algn="ctr"/>
+            <a:r>
+              <a:rPr lang="en-IN" dirty="0" smtClean="0">
+                <a:solidFill>
+                  <a:schemeClr val="bg1"/>
+                </a:solidFill>
+              </a:rPr>
+              <a:t>END</a:t>
+            </a:r>
+          </a:p>
+        </p:txBody>
+      </p:sp>
+      <p:sp>
+        <p:nvSpPr>
+          <p:cNvPr id="69" name="TextBox 68"/>
+          <p:cNvSpPr txBox="1"/>
+          <p:nvPr/>
+        </p:nvSpPr>
+        <p:spPr>
+          <a:xfrm>
+            <a:off x="2230300" y="486824"/>
+            <a:ext cx="1454199" cy="369332"/>
+          </a:xfrm>
+          <a:prstGeom prst="rect">
+            <a:avLst/>
+          </a:prstGeom>
+          <a:solidFill>
+            <a:srgbClr val="FF7C80"/>
+          </a:solidFill>
+        </p:spPr>
+        <p:txBody>
+          <a:bodyPr wrap="square" rtlCol="0">
+            <a:spAutoFit/>
+          </a:bodyPr>
+          <a:lstStyle/>
+          <a:p>
+            <a:pPr algn="ctr"/>
+            <a:r>
+              <a:rPr lang="en-IN" dirty="0" smtClean="0">
+                <a:solidFill>
+                  <a:schemeClr val="bg1"/>
+                </a:solidFill>
+              </a:rPr>
+              <a:t>START</a:t>
+            </a:r>
+          </a:p>
+        </p:txBody>
+      </p:sp>
+      <p:cxnSp>
+        <p:nvCxnSpPr>
+          <p:cNvPr id="70" name="Straight Arrow Connector 69"/>
+          <p:cNvCxnSpPr>
+            <a:stCxn id="69" idx="2"/>
+            <a:endCxn id="6" idx="0"/>
+          </p:cNvCxnSpPr>
+          <p:nvPr/>
+        </p:nvCxnSpPr>
+        <p:spPr>
+          <a:xfrm flipH="1">
+            <a:off x="2953409" y="856156"/>
+            <a:ext cx="3991" cy="281814"/>
+          </a:xfrm>
+          <a:prstGeom prst="straightConnector1">
+            <a:avLst/>
+          </a:prstGeom>
+          <a:ln>
+            <a:solidFill>
+              <a:srgbClr val="92D050"/>
+            </a:solidFill>
+            <a:tailEnd type="arrow"/>
+          </a:ln>
+        </p:spPr>
+        <p:style>
+          <a:lnRef idx="2">
+            <a:schemeClr val="accent5"/>
+          </a:lnRef>
+          <a:fillRef idx="0">
+            <a:schemeClr val="accent5"/>
+          </a:fillRef>
+          <a:effectRef idx="1">
+            <a:schemeClr val="accent5"/>
+          </a:effectRef>
+          <a:fontRef idx="minor">
+            <a:schemeClr val="tx1"/>
+          </a:fontRef>
+        </p:style>
+      </p:cxnSp>
+      <p:cxnSp>
+        <p:nvCxnSpPr>
+          <p:cNvPr id="76" name="Curved Connector 75"/>
+          <p:cNvCxnSpPr>
+            <a:stCxn id="47" idx="3"/>
+          </p:cNvCxnSpPr>
+          <p:nvPr/>
+        </p:nvCxnSpPr>
+        <p:spPr>
+          <a:xfrm flipH="1" flipV="1">
+            <a:off x="4004448" y="2526070"/>
+            <a:ext cx="972822" cy="1739958"/>
+          </a:xfrm>
+          <a:prstGeom prst="curvedConnector4">
+            <a:avLst>
+              <a:gd name="adj1" fmla="val -9454"/>
+              <a:gd name="adj2" fmla="val 55307"/>
+            </a:avLst>
+          </a:prstGeom>
+          <a:ln>
+            <a:tailEnd type="arrow"/>
+          </a:ln>
+        </p:spPr>
+        <p:style>
+          <a:lnRef idx="2">
+            <a:schemeClr val="accent1"/>
+          </a:lnRef>
+          <a:fillRef idx="0">
+            <a:schemeClr val="accent1"/>
+          </a:fillRef>
+          <a:effectRef idx="1">
+            <a:schemeClr val="accent1"/>
+          </a:effectRef>
+          <a:fontRef idx="minor">
+            <a:schemeClr val="tx1"/>
+          </a:fontRef>
+        </p:style>
+      </p:cxnSp>
+      <p:sp>
+        <p:nvSpPr>
+          <p:cNvPr id="85" name="TextBox 84"/>
+          <p:cNvSpPr txBox="1"/>
+          <p:nvPr/>
+        </p:nvSpPr>
+        <p:spPr>
+          <a:xfrm>
+            <a:off x="5020862" y="3256361"/>
+            <a:ext cx="1569128" cy="1015663"/>
+          </a:xfrm>
+          <a:prstGeom prst="rect">
+            <a:avLst/>
+          </a:prstGeom>
+          <a:noFill/>
+        </p:spPr>
+        <p:txBody>
+          <a:bodyPr wrap="square" rtlCol="0">
+            <a:spAutoFit/>
+          </a:bodyPr>
+          <a:lstStyle/>
+          <a:p>
+            <a:r>
+              <a:rPr lang="en-IN" sz="1200" b="1" u="sng" dirty="0" smtClean="0"/>
+              <a:t>If  (1</a:t>
+            </a:r>
+            <a:r>
+              <a:rPr lang="en-IN" sz="1200" b="1" u="sng" baseline="30000" dirty="0" smtClean="0"/>
+              <a:t>st</a:t>
+            </a:r>
+            <a:r>
+              <a:rPr lang="en-IN" sz="1200" b="1" u="sng" dirty="0" smtClean="0"/>
+              <a:t> trial &amp; 1-Draw): </a:t>
+            </a:r>
+            <a:r>
+              <a:rPr lang="en-IN" sz="1200" u="sng" dirty="0" smtClean="0"/>
+              <a:t>1 time draw</a:t>
+            </a:r>
+          </a:p>
+          <a:p>
+            <a:r>
+              <a:rPr lang="en-IN" sz="1200" dirty="0" smtClean="0"/>
+              <a:t>Both players get 1 last chance to select cards &amp; play again for free</a:t>
+            </a:r>
+            <a:endParaRPr lang="en-US" sz="1200" dirty="0"/>
+          </a:p>
+        </p:txBody>
+      </p:sp>
+      <p:cxnSp>
+        <p:nvCxnSpPr>
+          <p:cNvPr id="102" name="Shape 101"/>
+          <p:cNvCxnSpPr/>
+          <p:nvPr/>
+        </p:nvCxnSpPr>
+        <p:spPr>
+          <a:xfrm rot="10800000" flipV="1">
+            <a:off x="2386475" y="6095999"/>
+            <a:ext cx="1859704" cy="4083"/>
+          </a:xfrm>
+          <a:prstGeom prst="bentConnector3">
+            <a:avLst>
+              <a:gd name="adj1" fmla="val 50000"/>
+            </a:avLst>
+          </a:prstGeom>
+          <a:ln w="19050">
+            <a:tailEnd type="arrow"/>
+          </a:ln>
+        </p:spPr>
+        <p:style>
+          <a:lnRef idx="1">
+            <a:schemeClr val="accent1"/>
+          </a:lnRef>
+          <a:fillRef idx="0">
+            <a:schemeClr val="accent1"/>
+          </a:fillRef>
+          <a:effectRef idx="0">
+            <a:schemeClr val="accent1"/>
+          </a:effectRef>
+          <a:fontRef idx="minor">
+            <a:schemeClr val="tx1"/>
+          </a:fontRef>
+        </p:style>
+      </p:cxnSp>
+      <p:sp>
+        <p:nvSpPr>
+          <p:cNvPr id="110" name="TextBox 109"/>
+          <p:cNvSpPr txBox="1"/>
+          <p:nvPr/>
+        </p:nvSpPr>
+        <p:spPr>
+          <a:xfrm>
+            <a:off x="3207766" y="4438743"/>
+            <a:ext cx="1133644" cy="276999"/>
+          </a:xfrm>
+          <a:prstGeom prst="rect">
+            <a:avLst/>
+          </a:prstGeom>
+          <a:noFill/>
+        </p:spPr>
+        <p:txBody>
+          <a:bodyPr wrap="none" rtlCol="0">
+            <a:spAutoFit/>
+          </a:bodyPr>
+          <a:lstStyle/>
+          <a:p>
+            <a:r>
+              <a:rPr lang="en-IN" sz="1200" b="1" dirty="0" smtClean="0"/>
+              <a:t>During 2</a:t>
+            </a:r>
+            <a:r>
+              <a:rPr lang="en-IN" sz="1200" b="1" baseline="30000" dirty="0" smtClean="0"/>
+              <a:t>nd</a:t>
+            </a:r>
+            <a:r>
+              <a:rPr lang="en-IN" sz="1200" b="1" dirty="0" smtClean="0"/>
+              <a:t> trial</a:t>
+            </a:r>
+            <a:endParaRPr lang="en-US" sz="1200" b="1" dirty="0"/>
+          </a:p>
+        </p:txBody>
+      </p:sp>
+      <p:sp>
+        <p:nvSpPr>
+          <p:cNvPr id="111" name="TextBox 110"/>
+          <p:cNvSpPr txBox="1"/>
+          <p:nvPr/>
+        </p:nvSpPr>
+        <p:spPr>
+          <a:xfrm>
+            <a:off x="6639388" y="4906424"/>
+            <a:ext cx="1800419" cy="261610"/>
+          </a:xfrm>
+          <a:prstGeom prst="rect">
+            <a:avLst/>
+          </a:prstGeom>
+          <a:solidFill>
+            <a:schemeClr val="accent6">
+              <a:lumMod val="50000"/>
+            </a:schemeClr>
+          </a:solidFill>
+        </p:spPr>
+        <p:txBody>
+          <a:bodyPr wrap="square" rtlCol="0">
+            <a:spAutoFit/>
+          </a:bodyPr>
+          <a:lstStyle/>
+          <a:p>
+            <a:pPr algn="ctr"/>
+            <a:r>
+              <a:rPr lang="en-IN" sz="1100" dirty="0" smtClean="0">
+                <a:solidFill>
+                  <a:schemeClr val="bg1"/>
+                </a:solidFill>
+              </a:rPr>
+              <a:t>After no players select cards</a:t>
+            </a:r>
+          </a:p>
+        </p:txBody>
+      </p:sp>
+      <p:cxnSp>
+        <p:nvCxnSpPr>
+          <p:cNvPr id="113" name="Shape 112"/>
+          <p:cNvCxnSpPr>
+            <a:stCxn id="47" idx="2"/>
+            <a:endCxn id="111" idx="1"/>
+          </p:cNvCxnSpPr>
+          <p:nvPr/>
+        </p:nvCxnSpPr>
+        <p:spPr>
+          <a:xfrm rot="16200000" flipH="1">
+            <a:off x="5151512" y="3549352"/>
+            <a:ext cx="586535" cy="2389217"/>
+          </a:xfrm>
+          <a:prstGeom prst="bentConnector2">
+            <a:avLst/>
+          </a:prstGeom>
+          <a:ln>
+            <a:tailEnd type="arrow"/>
+          </a:ln>
+        </p:spPr>
+        <p:style>
+          <a:lnRef idx="2">
+            <a:schemeClr val="accent1"/>
+          </a:lnRef>
+          <a:fillRef idx="0">
+            <a:schemeClr val="accent1"/>
+          </a:fillRef>
+          <a:effectRef idx="1">
+            <a:schemeClr val="accent1"/>
+          </a:effectRef>
+          <a:fontRef idx="minor">
+            <a:schemeClr val="tx1"/>
+          </a:fontRef>
+        </p:style>
+      </p:cxnSp>
+      <p:sp>
+        <p:nvSpPr>
+          <p:cNvPr id="114" name="TextBox 113"/>
+          <p:cNvSpPr txBox="1"/>
+          <p:nvPr/>
+        </p:nvSpPr>
+        <p:spPr>
+          <a:xfrm>
+            <a:off x="9293254" y="4901169"/>
+            <a:ext cx="1742612" cy="261610"/>
+          </a:xfrm>
+          <a:prstGeom prst="rect">
+            <a:avLst/>
+          </a:prstGeom>
+          <a:solidFill>
+            <a:schemeClr val="accent6">
+              <a:lumMod val="50000"/>
+            </a:schemeClr>
+          </a:solidFill>
+        </p:spPr>
+        <p:txBody>
+          <a:bodyPr wrap="square" rtlCol="0">
+            <a:spAutoFit/>
+          </a:bodyPr>
+          <a:lstStyle/>
+          <a:p>
+            <a:pPr algn="ctr"/>
+            <a:r>
+              <a:rPr lang="en-IN" sz="1100" dirty="0" smtClean="0">
+                <a:solidFill>
+                  <a:schemeClr val="bg1"/>
+                </a:solidFill>
+              </a:rPr>
+              <a:t>After 1 player select cards</a:t>
+            </a:r>
+          </a:p>
+        </p:txBody>
+      </p:sp>
+      <p:sp>
+        <p:nvSpPr>
+          <p:cNvPr id="117" name="TextBox 116"/>
+          <p:cNvSpPr txBox="1"/>
+          <p:nvPr/>
+        </p:nvSpPr>
+        <p:spPr>
+          <a:xfrm>
+            <a:off x="5449599" y="5332153"/>
+            <a:ext cx="2081048" cy="461665"/>
+          </a:xfrm>
+          <a:prstGeom prst="rect">
+            <a:avLst/>
+          </a:prstGeom>
+          <a:noFill/>
+        </p:spPr>
+        <p:txBody>
+          <a:bodyPr wrap="square" rtlCol="0">
+            <a:spAutoFit/>
+          </a:bodyPr>
+          <a:lstStyle/>
+          <a:p>
+            <a:pPr algn="r"/>
+            <a:r>
+              <a:rPr lang="en-IN" sz="1200" dirty="0" smtClean="0"/>
+              <a:t>ACTION -&gt; </a:t>
+            </a:r>
+          </a:p>
+          <a:p>
+            <a:pPr algn="r"/>
+            <a:r>
+              <a:rPr lang="en-IN" sz="1200" dirty="0" smtClean="0"/>
+              <a:t>`gpkbattlesco::del1drawgame`</a:t>
+            </a:r>
+            <a:endParaRPr lang="en-US" sz="1200" dirty="0"/>
+          </a:p>
+        </p:txBody>
+      </p:sp>
+      <p:sp>
+        <p:nvSpPr>
+          <p:cNvPr id="118" name="TextBox 117"/>
+          <p:cNvSpPr txBox="1"/>
+          <p:nvPr/>
+        </p:nvSpPr>
+        <p:spPr>
+          <a:xfrm>
+            <a:off x="10121462" y="5347918"/>
+            <a:ext cx="2081048" cy="461665"/>
+          </a:xfrm>
+          <a:prstGeom prst="rect">
+            <a:avLst/>
+          </a:prstGeom>
+          <a:noFill/>
+        </p:spPr>
+        <p:txBody>
+          <a:bodyPr wrap="square" rtlCol="0">
+            <a:spAutoFit/>
+          </a:bodyPr>
+          <a:lstStyle/>
+          <a:p>
+            <a:r>
+              <a:rPr lang="en-IN" sz="1200" dirty="0" smtClean="0"/>
+              <a:t>ACTION -&gt; </a:t>
+            </a:r>
+          </a:p>
+          <a:p>
+            <a:r>
+              <a:rPr lang="en-IN" sz="1200" dirty="0" smtClean="0"/>
+              <a:t>`gpkbattlesco::del1drawgame`</a:t>
+            </a:r>
+            <a:endParaRPr lang="en-US" sz="1200" dirty="0"/>
+          </a:p>
+        </p:txBody>
+      </p:sp>
+      <p:cxnSp>
+        <p:nvCxnSpPr>
+          <p:cNvPr id="123" name="Shape 122"/>
+          <p:cNvCxnSpPr>
+            <a:endCxn id="111" idx="2"/>
+          </p:cNvCxnSpPr>
+          <p:nvPr/>
+        </p:nvCxnSpPr>
+        <p:spPr>
+          <a:xfrm flipV="1">
+            <a:off x="4235669" y="5168034"/>
+            <a:ext cx="3303929" cy="917458"/>
+          </a:xfrm>
+          <a:prstGeom prst="bentConnector2">
+            <a:avLst/>
+          </a:prstGeom>
+        </p:spPr>
+        <p:style>
+          <a:lnRef idx="2">
+            <a:schemeClr val="accent1"/>
+          </a:lnRef>
+          <a:fillRef idx="0">
+            <a:schemeClr val="accent1"/>
+          </a:fillRef>
+          <a:effectRef idx="1">
+            <a:schemeClr val="accent1"/>
+          </a:effectRef>
+          <a:fontRef idx="minor">
+            <a:schemeClr val="tx1"/>
+          </a:fontRef>
+        </p:style>
+      </p:cxnSp>
+      <p:cxnSp>
+        <p:nvCxnSpPr>
+          <p:cNvPr id="125" name="Shape 124"/>
+          <p:cNvCxnSpPr>
+            <a:endCxn id="114" idx="2"/>
+          </p:cNvCxnSpPr>
+          <p:nvPr/>
+        </p:nvCxnSpPr>
+        <p:spPr>
+          <a:xfrm flipV="1">
+            <a:off x="7493876" y="5162779"/>
+            <a:ext cx="2670684" cy="922712"/>
+          </a:xfrm>
+          <a:prstGeom prst="bentConnector2">
+            <a:avLst/>
+          </a:prstGeom>
+        </p:spPr>
+        <p:style>
+          <a:lnRef idx="2">
+            <a:schemeClr val="accent1"/>
+          </a:lnRef>
+          <a:fillRef idx="0">
+            <a:schemeClr val="accent1"/>
+          </a:fillRef>
+          <a:effectRef idx="1">
+            <a:schemeClr val="accent1"/>
+          </a:effectRef>
+          <a:fontRef idx="minor">
+            <a:schemeClr val="tx1"/>
+          </a:fontRef>
+        </p:style>
+      </p:cxnSp>
+      <p:cxnSp>
+        <p:nvCxnSpPr>
+          <p:cNvPr id="131" name="Shape 130"/>
+          <p:cNvCxnSpPr/>
+          <p:nvPr/>
+        </p:nvCxnSpPr>
+        <p:spPr>
+          <a:xfrm flipV="1">
+            <a:off x="5633545" y="4890659"/>
+            <a:ext cx="4531015" cy="143797"/>
+          </a:xfrm>
+          <a:prstGeom prst="bentConnector4">
+            <a:avLst>
+              <a:gd name="adj1" fmla="val 23"/>
+              <a:gd name="adj2" fmla="val 258974"/>
+            </a:avLst>
+          </a:prstGeom>
+          <a:ln w="19050">
+            <a:tailEnd type="arrow"/>
+          </a:ln>
+        </p:spPr>
+        <p:style>
+          <a:lnRef idx="1">
+            <a:schemeClr val="accent1"/>
+          </a:lnRef>
+          <a:fillRef idx="0">
+            <a:schemeClr val="accent1"/>
+          </a:fillRef>
+          <a:effectRef idx="0">
+            <a:schemeClr val="accent1"/>
+          </a:effectRef>
+          <a:fontRef idx="minor">
+            <a:schemeClr val="tx1"/>
+          </a:fontRef>
+        </p:style>
+      </p:cxnSp>
+      <p:cxnSp>
+        <p:nvCxnSpPr>
+          <p:cNvPr id="52" name="Elbow Connector 51"/>
+          <p:cNvCxnSpPr>
+            <a:endCxn id="46" idx="3"/>
+          </p:cNvCxnSpPr>
+          <p:nvPr/>
+        </p:nvCxnSpPr>
+        <p:spPr>
+          <a:xfrm rot="10800000">
+            <a:off x="2386471" y="4292303"/>
+            <a:ext cx="1849199" cy="920828"/>
+          </a:xfrm>
+          <a:prstGeom prst="bentConnector3">
+            <a:avLst>
+              <a:gd name="adj1" fmla="val 72735"/>
+            </a:avLst>
+          </a:prstGeom>
+          <a:ln>
+            <a:tailEnd type="arrow"/>
+          </a:ln>
+        </p:spPr>
+        <p:style>
+          <a:lnRef idx="2">
+            <a:schemeClr val="accent1"/>
+          </a:lnRef>
+          <a:fillRef idx="0">
+            <a:schemeClr val="accent1"/>
+          </a:fillRef>
+          <a:effectRef idx="1">
+            <a:schemeClr val="accent1"/>
+          </a:effectRef>
+          <a:fontRef idx="minor">
+            <a:schemeClr val="tx1"/>
+          </a:fontRef>
+        </p:style>
+      </p:cxnSp>
+      <p:sp>
+        <p:nvSpPr>
+          <p:cNvPr id="56" name="TextBox 55"/>
+          <p:cNvSpPr txBox="1"/>
+          <p:nvPr/>
+        </p:nvSpPr>
+        <p:spPr>
+          <a:xfrm>
+            <a:off x="3517816" y="5473983"/>
+            <a:ext cx="1454199" cy="369332"/>
+          </a:xfrm>
+          <a:prstGeom prst="rect">
+            <a:avLst/>
+          </a:prstGeom>
+          <a:solidFill>
+            <a:schemeClr val="accent6">
+              <a:lumMod val="50000"/>
+            </a:schemeClr>
+          </a:solidFill>
+        </p:spPr>
+        <p:txBody>
+          <a:bodyPr wrap="square" rtlCol="0">
+            <a:spAutoFit/>
+          </a:bodyPr>
+          <a:lstStyle/>
+          <a:p>
+            <a:pPr algn="ctr"/>
+            <a:r>
+              <a:rPr lang="en-IN" dirty="0" smtClean="0">
+                <a:solidFill>
+                  <a:schemeClr val="bg1"/>
+                </a:solidFill>
+              </a:rPr>
+              <a:t>2-Draw</a:t>
+            </a:r>
+            <a:endParaRPr lang="en-IN" dirty="0" smtClean="0">
+              <a:solidFill>
+                <a:schemeClr val="bg1"/>
+              </a:solidFill>
+            </a:endParaRPr>
+          </a:p>
+        </p:txBody>
+      </p:sp>
+      <p:cxnSp>
+        <p:nvCxnSpPr>
+          <p:cNvPr id="61" name="Straight Connector 60"/>
+          <p:cNvCxnSpPr/>
+          <p:nvPr/>
+        </p:nvCxnSpPr>
+        <p:spPr>
+          <a:xfrm flipH="1">
+            <a:off x="4256689" y="5843315"/>
+            <a:ext cx="9247" cy="284216"/>
+          </a:xfrm>
+          <a:prstGeom prst="line">
+            <a:avLst/>
+          </a:prstGeom>
+        </p:spPr>
+        <p:style>
+          <a:lnRef idx="1">
+            <a:schemeClr val="accent1"/>
+          </a:lnRef>
+          <a:fillRef idx="0">
+            <a:schemeClr val="accent1"/>
+          </a:fillRef>
+          <a:effectRef idx="0">
+            <a:schemeClr val="accent1"/>
+          </a:effectRef>
+          <a:fontRef idx="minor">
+            <a:schemeClr val="tx1"/>
+          </a:fontRef>
+        </p:style>
+      </p:cxnSp>
+      <p:cxnSp>
+        <p:nvCxnSpPr>
+          <p:cNvPr id="67" name="Straight Arrow Connector 66"/>
+          <p:cNvCxnSpPr>
+            <a:endCxn id="56" idx="1"/>
+          </p:cNvCxnSpPr>
+          <p:nvPr/>
+        </p:nvCxnSpPr>
+        <p:spPr>
+          <a:xfrm>
+            <a:off x="2879834" y="5654566"/>
+            <a:ext cx="637982" cy="4083"/>
+          </a:xfrm>
+          <a:prstGeom prst="straightConnector1">
+            <a:avLst/>
+          </a:prstGeom>
+          <a:ln>
+            <a:solidFill>
+              <a:srgbClr val="92D050"/>
+            </a:solidFill>
+            <a:tailEnd type="arrow"/>
+          </a:ln>
+        </p:spPr>
+        <p:style>
+          <a:lnRef idx="2">
+            <a:schemeClr val="accent5"/>
+          </a:lnRef>
+          <a:fillRef idx="0">
+            <a:schemeClr val="accent5"/>
+          </a:fillRef>
+          <a:effectRef idx="1">
+            <a:schemeClr val="accent5"/>
+          </a:effectRef>
+          <a:fontRef idx="minor">
+            <a:schemeClr val="tx1"/>
+          </a:fontRef>
+        </p:style>
+      </p:cxnSp>
+      <p:cxnSp>
+        <p:nvCxnSpPr>
+          <p:cNvPr id="77" name="Straight Connector 76"/>
+          <p:cNvCxnSpPr/>
+          <p:nvPr/>
+        </p:nvCxnSpPr>
+        <p:spPr>
+          <a:xfrm>
+            <a:off x="2889082" y="5202183"/>
+            <a:ext cx="11773" cy="473403"/>
+          </a:xfrm>
+          <a:prstGeom prst="line">
+            <a:avLst/>
+          </a:prstGeom>
+          <a:ln w="19050"/>
+        </p:spPr>
+        <p:style>
+          <a:lnRef idx="1">
+            <a:schemeClr val="accent1"/>
+          </a:lnRef>
+          <a:fillRef idx="0">
+            <a:schemeClr val="accent1"/>
+          </a:fillRef>
+          <a:effectRef idx="0">
+            <a:schemeClr val="accent1"/>
+          </a:effectRef>
+          <a:fontRef idx="minor">
+            <a:schemeClr val="tx1"/>
+          </a:fontRef>
+        </p:style>
+      </p:cxnSp>
+      <p:sp>
+        <p:nvSpPr>
+          <p:cNvPr id="82" name="TextBox 81"/>
+          <p:cNvSpPr txBox="1"/>
+          <p:nvPr/>
+        </p:nvSpPr>
+        <p:spPr>
+          <a:xfrm>
+            <a:off x="2876665" y="3371941"/>
+            <a:ext cx="1100429" cy="276999"/>
+          </a:xfrm>
+          <a:prstGeom prst="rect">
+            <a:avLst/>
+          </a:prstGeom>
+          <a:noFill/>
+        </p:spPr>
+        <p:txBody>
+          <a:bodyPr wrap="none" rtlCol="0">
+            <a:spAutoFit/>
+          </a:bodyPr>
+          <a:lstStyle/>
+          <a:p>
+            <a:r>
+              <a:rPr lang="en-IN" sz="1200" b="1" dirty="0" smtClean="0"/>
+              <a:t>During </a:t>
+            </a:r>
+            <a:r>
+              <a:rPr lang="en-IN" sz="1200" b="1" dirty="0" smtClean="0"/>
+              <a:t>1</a:t>
+            </a:r>
+            <a:r>
+              <a:rPr lang="en-IN" sz="1200" b="1" baseline="30000" dirty="0" smtClean="0"/>
+              <a:t>st</a:t>
+            </a:r>
+            <a:r>
+              <a:rPr lang="en-IN" sz="1200" b="1" dirty="0" smtClean="0"/>
+              <a:t> </a:t>
+            </a:r>
+            <a:r>
+              <a:rPr lang="en-IN" sz="1200" b="1" dirty="0" smtClean="0"/>
+              <a:t>trial</a:t>
+            </a:r>
+            <a:endParaRPr lang="en-US" sz="1200" b="1" dirty="0"/>
+          </a:p>
+        </p:txBody>
+      </p:sp>
+      <p:sp>
+        <p:nvSpPr>
+          <p:cNvPr id="83" name="TextBox 82"/>
+          <p:cNvSpPr txBox="1"/>
+          <p:nvPr/>
+        </p:nvSpPr>
+        <p:spPr>
+          <a:xfrm>
+            <a:off x="3134188" y="4834758"/>
+            <a:ext cx="859743" cy="600164"/>
+          </a:xfrm>
+          <a:prstGeom prst="rect">
+            <a:avLst/>
+          </a:prstGeom>
+          <a:solidFill>
+            <a:schemeClr val="accent6">
+              <a:lumMod val="50000"/>
+            </a:schemeClr>
+          </a:solidFill>
+        </p:spPr>
+        <p:txBody>
+          <a:bodyPr wrap="square" rtlCol="0">
+            <a:spAutoFit/>
+          </a:bodyPr>
+          <a:lstStyle/>
+          <a:p>
+            <a:pPr algn="ctr"/>
+            <a:r>
+              <a:rPr lang="en-IN" sz="1100" dirty="0" smtClean="0">
+                <a:solidFill>
+                  <a:schemeClr val="bg1"/>
+                </a:solidFill>
+              </a:rPr>
+              <a:t>After </a:t>
+            </a:r>
+            <a:r>
+              <a:rPr lang="en-IN" sz="1100" dirty="0" smtClean="0">
+                <a:solidFill>
+                  <a:schemeClr val="bg1"/>
+                </a:solidFill>
+              </a:rPr>
+              <a:t>both players </a:t>
+            </a:r>
+            <a:r>
+              <a:rPr lang="en-IN" sz="1100" dirty="0" smtClean="0">
+                <a:solidFill>
+                  <a:schemeClr val="bg1"/>
+                </a:solidFill>
+              </a:rPr>
+              <a:t>select cards</a:t>
+            </a:r>
+          </a:p>
+        </p:txBody>
+      </p:sp>
+      <p:cxnSp>
+        <p:nvCxnSpPr>
+          <p:cNvPr id="97" name="Straight Connector 96"/>
+          <p:cNvCxnSpPr/>
+          <p:nvPr/>
+        </p:nvCxnSpPr>
+        <p:spPr>
+          <a:xfrm flipH="1">
+            <a:off x="4240925" y="4834321"/>
+            <a:ext cx="3991" cy="384065"/>
+          </a:xfrm>
+          <a:prstGeom prst="line">
+            <a:avLst/>
+          </a:prstGeom>
+          <a:ln w="19050"/>
+        </p:spPr>
+        <p:style>
+          <a:lnRef idx="1">
+            <a:schemeClr val="accent1"/>
+          </a:lnRef>
+          <a:fillRef idx="0">
+            <a:schemeClr val="accent1"/>
+          </a:fillRef>
+          <a:effectRef idx="0">
+            <a:schemeClr val="accent1"/>
+          </a:effectRef>
+          <a:fontRef idx="minor">
+            <a:schemeClr val="tx1"/>
+          </a:fontRef>
+        </p:style>
+      </p:cxnSp>
+    </p:spTree>
+  </p:cSld>
+  <p:clrMapOvr>
+    <a:masterClrMapping/>
+  </p:clrMapOvr>
+</p:sld>
+</file>
+
+<file path=ppt/slides/slide5.xml><?xml version="1.0" encoding="utf-8"?>
+<p:sld xmlns:a="http://schemas.openxmlformats.org/drawingml/2006/main" xmlns:r="http://schemas.openxmlformats.org/officeDocument/2006/relationships" xmlns:p="http://schemas.openxmlformats.org/presentationml/2006/main">
+  <p:cSld>
+    <p:spTree>
+      <p:nvGrpSpPr>
+        <p:cNvPr id="1" name=""/>
+        <p:cNvGrpSpPr/>
+        <p:nvPr/>
+      </p:nvGrpSpPr>
+      <p:grpSpPr>
+        <a:xfrm>
+          <a:off x="0" y="0"/>
+          <a:ext cx="0" cy="0"/>
+          <a:chOff x="0" y="0"/>
+          <a:chExt cx="0" cy="0"/>
+        </a:xfrm>
+      </p:grpSpPr>
+      <p:sp>
+        <p:nvSpPr>
+          <p:cNvPr id="6" name="TextBox 5">
+            <a:extLst>
+              <a:ext uri="{FF2B5EF4-FFF2-40B4-BE49-F238E27FC236}">
+                <a16:creationId xmlns="" xmlns:a16="http://schemas.microsoft.com/office/drawing/2014/main" id="{781233F3-E30F-4EEA-AA0B-BF294238B536}"/>
+              </a:ext>
+            </a:extLst>
+          </p:cNvPr>
+          <p:cNvSpPr txBox="1"/>
+          <p:nvPr/>
+        </p:nvSpPr>
+        <p:spPr>
+          <a:xfrm>
+            <a:off x="557963" y="355107"/>
+            <a:ext cx="1528290" cy="369332"/>
+          </a:xfrm>
+          <a:prstGeom prst="rect">
+            <a:avLst/>
+          </a:prstGeom>
+          <a:solidFill>
+            <a:schemeClr val="tx1">
+              <a:lumMod val="65000"/>
+              <a:lumOff val="35000"/>
+            </a:schemeClr>
+          </a:solidFill>
+        </p:spPr>
+        <p:txBody>
+          <a:bodyPr wrap="square" rtlCol="0">
+            <a:spAutoFit/>
+          </a:bodyPr>
+          <a:lstStyle/>
+          <a:p>
+            <a:r>
+              <a:rPr lang="en-US" dirty="0">
+                <a:solidFill>
+                  <a:schemeClr val="bg1"/>
+                </a:solidFill>
+              </a:rPr>
+              <a:t>gbuser111111</a:t>
+            </a:r>
+          </a:p>
+        </p:txBody>
+      </p:sp>
+      <p:sp>
+        <p:nvSpPr>
+          <p:cNvPr id="7" name="TextBox 6">
+            <a:extLst>
+              <a:ext uri="{FF2B5EF4-FFF2-40B4-BE49-F238E27FC236}">
+                <a16:creationId xmlns="" xmlns:a16="http://schemas.microsoft.com/office/drawing/2014/main" id="{70F34349-423A-4115-84D8-416509751460}"/>
+              </a:ext>
+            </a:extLst>
+          </p:cNvPr>
+          <p:cNvSpPr txBox="1"/>
+          <p:nvPr/>
+        </p:nvSpPr>
+        <p:spPr>
+          <a:xfrm>
+            <a:off x="2077261" y="353474"/>
+            <a:ext cx="4008341" cy="369332"/>
+          </a:xfrm>
+          <a:prstGeom prst="rect">
+            <a:avLst/>
+          </a:prstGeom>
+          <a:noFill/>
+        </p:spPr>
+        <p:txBody>
+          <a:bodyPr wrap="none" rtlCol="0">
+            <a:spAutoFit/>
+          </a:bodyPr>
+          <a:lstStyle/>
+          <a:p>
+            <a:pPr algn="ctr"/>
+            <a:r>
+              <a:rPr lang="en-IN" dirty="0" smtClean="0"/>
+              <a:t>transfer desired cards to escrow contract</a:t>
+            </a:r>
+          </a:p>
+        </p:txBody>
+      </p:sp>
+      <p:sp>
+        <p:nvSpPr>
+          <p:cNvPr id="9" name="TextBox 8">
+            <a:extLst>
+              <a:ext uri="{FF2B5EF4-FFF2-40B4-BE49-F238E27FC236}">
+                <a16:creationId xmlns="" xmlns:a16="http://schemas.microsoft.com/office/drawing/2014/main" id="{9A03A4A8-B03D-48D3-BA8B-431536EDCBA4}"/>
+              </a:ext>
+            </a:extLst>
+          </p:cNvPr>
+          <p:cNvSpPr txBox="1"/>
+          <p:nvPr/>
+        </p:nvSpPr>
+        <p:spPr>
+          <a:xfrm>
+            <a:off x="6118966" y="362354"/>
+            <a:ext cx="1489895" cy="369332"/>
+          </a:xfrm>
+          <a:prstGeom prst="rect">
+            <a:avLst/>
+          </a:prstGeom>
+          <a:solidFill>
+            <a:srgbClr val="7030A0"/>
+          </a:solidFill>
+        </p:spPr>
+        <p:txBody>
+          <a:bodyPr wrap="none" rtlCol="0">
+            <a:spAutoFit/>
+          </a:bodyPr>
+          <a:lstStyle/>
+          <a:p>
+            <a:r>
+              <a:rPr lang="en-US" dirty="0" smtClean="0">
+                <a:solidFill>
+                  <a:schemeClr val="bg1"/>
+                </a:solidFill>
+              </a:rPr>
+              <a:t>gpkbatescrow</a:t>
+            </a:r>
+            <a:endParaRPr lang="en-US" dirty="0">
+              <a:solidFill>
+                <a:schemeClr val="bg1"/>
+              </a:solidFill>
+            </a:endParaRPr>
+          </a:p>
+        </p:txBody>
+      </p:sp>
+      <p:sp>
+        <p:nvSpPr>
+          <p:cNvPr id="12" name="TextBox 11"/>
+          <p:cNvSpPr txBox="1"/>
+          <p:nvPr/>
+        </p:nvSpPr>
+        <p:spPr>
+          <a:xfrm>
+            <a:off x="147145" y="367861"/>
+            <a:ext cx="359394" cy="369332"/>
+          </a:xfrm>
+          <a:prstGeom prst="rect">
+            <a:avLst/>
+          </a:prstGeom>
+          <a:noFill/>
+        </p:spPr>
+        <p:txBody>
+          <a:bodyPr wrap="none" rtlCol="0">
+            <a:spAutoFit/>
+          </a:bodyPr>
+          <a:lstStyle/>
+          <a:p>
+            <a:r>
+              <a:rPr lang="en-IN" dirty="0" smtClean="0"/>
+              <a:t>1.</a:t>
+            </a:r>
+            <a:endParaRPr lang="en-US" dirty="0"/>
+          </a:p>
+        </p:txBody>
+      </p:sp>
+      <p:sp>
+        <p:nvSpPr>
+          <p:cNvPr id="14" name="TextBox 13"/>
+          <p:cNvSpPr txBox="1"/>
+          <p:nvPr/>
+        </p:nvSpPr>
+        <p:spPr>
+          <a:xfrm>
+            <a:off x="956441" y="1439913"/>
+            <a:ext cx="495841" cy="369332"/>
+          </a:xfrm>
+          <a:prstGeom prst="rect">
+            <a:avLst/>
+          </a:prstGeom>
+          <a:solidFill>
+            <a:srgbClr val="FFC000"/>
+          </a:solidFill>
+        </p:spPr>
+        <p:txBody>
+          <a:bodyPr wrap="none" rtlCol="0">
+            <a:spAutoFit/>
+          </a:bodyPr>
+          <a:lstStyle/>
+          <a:p>
+            <a:r>
+              <a:rPr lang="en-IN" dirty="0" smtClean="0"/>
+              <a:t>Pre</a:t>
+            </a:r>
+            <a:endParaRPr lang="en-US" dirty="0"/>
+          </a:p>
+        </p:txBody>
+      </p:sp>
+      <p:sp>
+        <p:nvSpPr>
+          <p:cNvPr id="15" name="TextBox 14"/>
+          <p:cNvSpPr txBox="1"/>
+          <p:nvPr/>
+        </p:nvSpPr>
+        <p:spPr>
+          <a:xfrm>
+            <a:off x="9212317" y="1476704"/>
+            <a:ext cx="584647" cy="369332"/>
+          </a:xfrm>
+          <a:prstGeom prst="rect">
+            <a:avLst/>
+          </a:prstGeom>
+          <a:solidFill>
+            <a:schemeClr val="accent1"/>
+          </a:solidFill>
+        </p:spPr>
+        <p:txBody>
+          <a:bodyPr wrap="none" rtlCol="0">
+            <a:spAutoFit/>
+          </a:bodyPr>
+          <a:lstStyle/>
+          <a:p>
+            <a:r>
+              <a:rPr lang="en-IN" dirty="0" smtClean="0"/>
+              <a:t>Post</a:t>
+            </a:r>
+            <a:endParaRPr lang="en-US" dirty="0"/>
+          </a:p>
+        </p:txBody>
+      </p:sp>
+      <p:sp>
+        <p:nvSpPr>
+          <p:cNvPr id="16" name="TextBox 15"/>
+          <p:cNvSpPr txBox="1"/>
+          <p:nvPr/>
+        </p:nvSpPr>
+        <p:spPr>
+          <a:xfrm>
+            <a:off x="4939862" y="1481959"/>
+            <a:ext cx="883575" cy="369332"/>
+          </a:xfrm>
+          <a:prstGeom prst="rect">
+            <a:avLst/>
+          </a:prstGeom>
+          <a:solidFill>
+            <a:schemeClr val="accent6"/>
+          </a:solidFill>
+        </p:spPr>
+        <p:txBody>
+          <a:bodyPr wrap="none" rtlCol="0">
+            <a:spAutoFit/>
+          </a:bodyPr>
+          <a:lstStyle/>
+          <a:p>
+            <a:r>
+              <a:rPr lang="en-IN" dirty="0" smtClean="0"/>
+              <a:t>Activity</a:t>
+            </a:r>
+            <a:endParaRPr lang="en-US" dirty="0"/>
+          </a:p>
+        </p:txBody>
+      </p:sp>
+    </p:spTree>
+    <p:extLst>
+      <p:ext uri="{BB962C8B-B14F-4D97-AF65-F5344CB8AC3E}">
+        <p14:creationId xmlns="" xmlns:p14="http://schemas.microsoft.com/office/powerpoint/2010/main" val="2551920288"/>
+      </p:ext>
+    </p:extLst>
+  </p:cSld>
+  <p:clrMapOvr>
+    <a:masterClrMapping/>
+  </p:clrMapOvr>
+</p:sld>
+</file>
+
+<file path=ppt/slides/slide6.xml><?xml version="1.0" encoding="utf-8"?>
+<p:sld xmlns:a="http://schemas.openxmlformats.org/drawingml/2006/main" xmlns:r="http://schemas.openxmlformats.org/officeDocument/2006/relationships" xmlns:p="http://schemas.openxmlformats.org/presentationml/2006/main">
+  <p:cSld>
+    <p:spTree>
+      <p:nvGrpSpPr>
+        <p:cNvPr id="1" name=""/>
+        <p:cNvGrpSpPr/>
+        <p:nvPr/>
+      </p:nvGrpSpPr>
+      <p:grpSpPr>
+        <a:xfrm>
+          <a:off x="0" y="0"/>
+          <a:ext cx="0" cy="0"/>
+          <a:chOff x="0" y="0"/>
+          <a:chExt cx="0" cy="0"/>
+        </a:xfrm>
+      </p:grpSpPr>
+      <p:grpSp>
+        <p:nvGrpSpPr>
+          <p:cNvPr id="2" name="Group 12"/>
           <p:cNvGrpSpPr/>
           <p:nvPr/>
         </p:nvGrpSpPr>
         <p:grpSpPr>
           <a:xfrm>
-            <a:off x="557963" y="355107"/>
-            <a:ext cx="9446493" cy="387089"/>
-            <a:chOff x="557963" y="355107"/>
-            <a:chExt cx="9446493" cy="387089"/>
+            <a:off x="147145" y="355107"/>
+            <a:ext cx="3478666" cy="382086"/>
+            <a:chOff x="147145" y="355107"/>
+            <a:chExt cx="3478666" cy="382086"/>
           </a:xfrm>
         </p:grpSpPr>
         <p:sp>
@@ -4200,7 +6548,7 @@
             <p:cNvPr id="6" name="TextBox 5">
               <a:extLst>
                 <a:ext uri="{FF2B5EF4-FFF2-40B4-BE49-F238E27FC236}">
-                  <a16:creationId xmlns:a16="http://schemas.microsoft.com/office/drawing/2014/main" id="{781233F3-E30F-4EEA-AA0B-BF294238B536}"/>
+                  <a16:creationId xmlns="" xmlns:a16="http://schemas.microsoft.com/office/drawing/2014/main" id="{781233F3-E30F-4EEA-AA0B-BF294238B536}"/>
                 </a:ext>
               </a:extLst>
             </p:cNvPr>
@@ -4244,7 +6592,7 @@
             <p:cNvPr id="7" name="TextBox 6">
               <a:extLst>
                 <a:ext uri="{FF2B5EF4-FFF2-40B4-BE49-F238E27FC236}">
-                  <a16:creationId xmlns:a16="http://schemas.microsoft.com/office/drawing/2014/main" id="{70F34349-423A-4115-84D8-416509751460}"/>
+                  <a16:creationId xmlns="" xmlns:a16="http://schemas.microsoft.com/office/drawing/2014/main" id="{70F34349-423A-4115-84D8-416509751460}"/>
                 </a:ext>
               </a:extLst>
             </p:cNvPr>
@@ -4254,7 +6602,7 @@
           <p:spPr>
             <a:xfrm>
               <a:off x="2175029" y="363985"/>
-              <a:ext cx="3683894" cy="369332"/>
+              <a:ext cx="1450782" cy="369332"/>
             </a:xfrm>
             <a:prstGeom prst="rect">
               <a:avLst/>
@@ -4268,120 +6616,27 @@
             <a:lstStyle/>
             <a:p>
               <a:r>
-                <a:rPr lang="en-US" dirty="0"/>
-                <a:t>check for </a:t>
+                <a:rPr lang="en-US" dirty="0" smtClean="0"/>
+                <a:t>s</a:t>
               </a:r>
               <a:r>
-                <a:rPr lang="en-US" dirty="0" err="1"/>
-                <a:t>game_fee</a:t>
+                <a:rPr lang="en-US" dirty="0" smtClean="0"/>
+                <a:t>elect 3 cards</a:t>
               </a:r>
-              <a:r>
-                <a:rPr lang="en-US" dirty="0"/>
-                <a:t> balance in table -</a:t>
-              </a:r>
+              <a:endParaRPr lang="en-US" dirty="0"/>
             </a:p>
           </p:txBody>
         </p:sp>
         <p:sp>
           <p:nvSpPr>
-            <p:cNvPr id="8" name="TextBox 7">
-              <a:extLst>
-                <a:ext uri="{FF2B5EF4-FFF2-40B4-BE49-F238E27FC236}">
-                  <a16:creationId xmlns:a16="http://schemas.microsoft.com/office/drawing/2014/main" id="{FF4228EF-F821-488C-92FA-E558DFBD4246}"/>
-                </a:ext>
-              </a:extLst>
-            </p:cNvPr>
+            <p:cNvPr id="12" name="TextBox 11"/>
             <p:cNvSpPr txBox="1"/>
             <p:nvPr/>
           </p:nvSpPr>
           <p:spPr>
             <a:xfrm>
-              <a:off x="5858923" y="363986"/>
-              <a:ext cx="1158202" cy="369332"/>
-            </a:xfrm>
-            <a:prstGeom prst="rect">
-              <a:avLst/>
-            </a:prstGeom>
-            <a:solidFill>
-              <a:schemeClr val="accent5">
-                <a:lumMod val="75000"/>
-              </a:schemeClr>
-            </a:solidFill>
-          </p:spPr>
-          <p:txBody>
-            <a:bodyPr wrap="none" rtlCol="0">
-              <a:spAutoFit/>
-            </a:bodyPr>
-            <a:lstStyle/>
-            <a:p>
-              <a:r>
-                <a:rPr lang="en-US" dirty="0">
-                  <a:solidFill>
-                    <a:schemeClr val="bg1"/>
-                  </a:solidFill>
-                </a:rPr>
-                <a:t>gfeewallet</a:t>
-              </a:r>
-            </a:p>
-          </p:txBody>
-        </p:sp>
-        <p:sp>
-          <p:nvSpPr>
-            <p:cNvPr id="9" name="TextBox 8">
-              <a:extLst>
-                <a:ext uri="{FF2B5EF4-FFF2-40B4-BE49-F238E27FC236}">
-                  <a16:creationId xmlns:a16="http://schemas.microsoft.com/office/drawing/2014/main" id="{9A03A4A8-B03D-48D3-BA8B-431536EDCBA4}"/>
-                </a:ext>
-              </a:extLst>
-            </p:cNvPr>
-            <p:cNvSpPr txBox="1"/>
-            <p:nvPr/>
-          </p:nvSpPr>
-          <p:spPr>
-            <a:xfrm>
-              <a:off x="8630938" y="372864"/>
-              <a:ext cx="1373518" cy="369332"/>
-            </a:xfrm>
-            <a:prstGeom prst="rect">
-              <a:avLst/>
-            </a:prstGeom>
-            <a:solidFill>
-              <a:srgbClr val="7030A0"/>
-            </a:solidFill>
-          </p:spPr>
-          <p:txBody>
-            <a:bodyPr wrap="none" rtlCol="0">
-              <a:spAutoFit/>
-            </a:bodyPr>
-            <a:lstStyle/>
-            <a:p>
-              <a:r>
-                <a:rPr lang="en-US" dirty="0">
-                  <a:solidFill>
-                    <a:schemeClr val="bg1"/>
-                  </a:solidFill>
-                </a:rPr>
-                <a:t>gpkbattlesc1</a:t>
-              </a:r>
-            </a:p>
-          </p:txBody>
-        </p:sp>
-        <p:sp>
-          <p:nvSpPr>
-            <p:cNvPr id="10" name="TextBox 9">
-              <a:extLst>
-                <a:ext uri="{FF2B5EF4-FFF2-40B4-BE49-F238E27FC236}">
-                  <a16:creationId xmlns:a16="http://schemas.microsoft.com/office/drawing/2014/main" id="{DFEC3C30-604E-4C18-B9CE-BC90EBEAFD2B}"/>
-                </a:ext>
-              </a:extLst>
-            </p:cNvPr>
-            <p:cNvSpPr txBox="1"/>
-            <p:nvPr/>
-          </p:nvSpPr>
-          <p:spPr>
-            <a:xfrm>
-              <a:off x="7159811" y="372863"/>
-              <a:ext cx="1328441" cy="369332"/>
+              <a:off x="147145" y="367861"/>
+              <a:ext cx="359394" cy="369332"/>
             </a:xfrm>
             <a:prstGeom prst="rect">
               <a:avLst/>
@@ -4395,17 +6650,118 @@
             <a:lstStyle/>
             <a:p>
               <a:r>
-                <a:rPr lang="en-US" dirty="0"/>
-                <a:t>of contract -</a:t>
+                <a:rPr lang="en-IN" dirty="0" smtClean="0"/>
+                <a:t>2</a:t>
               </a:r>
+              <a:r>
+                <a:rPr lang="en-IN" dirty="0" smtClean="0"/>
+                <a:t>.</a:t>
+              </a:r>
+              <a:endParaRPr lang="en-US" dirty="0"/>
             </a:p>
           </p:txBody>
         </p:sp>
       </p:grpSp>
+      <p:sp>
+        <p:nvSpPr>
+          <p:cNvPr id="11" name="TextBox 10"/>
+          <p:cNvSpPr txBox="1"/>
+          <p:nvPr/>
+        </p:nvSpPr>
+        <p:spPr>
+          <a:xfrm>
+            <a:off x="956441" y="1439913"/>
+            <a:ext cx="495841" cy="369332"/>
+          </a:xfrm>
+          <a:prstGeom prst="rect">
+            <a:avLst/>
+          </a:prstGeom>
+          <a:solidFill>
+            <a:srgbClr val="FFC000"/>
+          </a:solidFill>
+        </p:spPr>
+        <p:txBody>
+          <a:bodyPr wrap="none" rtlCol="0">
+            <a:spAutoFit/>
+          </a:bodyPr>
+          <a:lstStyle/>
+          <a:p>
+            <a:r>
+              <a:rPr lang="en-IN" dirty="0" smtClean="0"/>
+              <a:t>Pre</a:t>
+            </a:r>
+            <a:endParaRPr lang="en-US" dirty="0"/>
+          </a:p>
+        </p:txBody>
+      </p:sp>
+      <p:sp>
+        <p:nvSpPr>
+          <p:cNvPr id="13" name="TextBox 12"/>
+          <p:cNvSpPr txBox="1"/>
+          <p:nvPr/>
+        </p:nvSpPr>
+        <p:spPr>
+          <a:xfrm>
+            <a:off x="9212317" y="1476704"/>
+            <a:ext cx="584647" cy="369332"/>
+          </a:xfrm>
+          <a:prstGeom prst="rect">
+            <a:avLst/>
+          </a:prstGeom>
+          <a:solidFill>
+            <a:schemeClr val="accent1"/>
+          </a:solidFill>
+        </p:spPr>
+        <p:txBody>
+          <a:bodyPr wrap="none" rtlCol="0">
+            <a:spAutoFit/>
+          </a:bodyPr>
+          <a:lstStyle/>
+          <a:p>
+            <a:r>
+              <a:rPr lang="en-IN" dirty="0" smtClean="0"/>
+              <a:t>Post</a:t>
+            </a:r>
+            <a:endParaRPr lang="en-US" dirty="0"/>
+          </a:p>
+        </p:txBody>
+      </p:sp>
+      <p:sp>
+        <p:nvSpPr>
+          <p:cNvPr id="14" name="TextBox 13"/>
+          <p:cNvSpPr txBox="1"/>
+          <p:nvPr/>
+        </p:nvSpPr>
+        <p:spPr>
+          <a:xfrm>
+            <a:off x="4939862" y="1481959"/>
+            <a:ext cx="883575" cy="369332"/>
+          </a:xfrm>
+          <a:prstGeom prst="rect">
+            <a:avLst/>
+          </a:prstGeom>
+          <a:solidFill>
+            <a:schemeClr val="accent6"/>
+          </a:solidFill>
+        </p:spPr>
+        <p:txBody>
+          <a:bodyPr wrap="none" rtlCol="0">
+            <a:spAutoFit/>
+          </a:bodyPr>
+          <a:lstStyle/>
+          <a:p>
+            <a:r>
+              <a:rPr lang="en-IN" dirty="0" smtClean="0"/>
+              <a:t>Activity</a:t>
+            </a:r>
+            <a:endParaRPr lang="en-US" dirty="0"/>
+          </a:p>
+        </p:txBody>
+      </p:sp>
     </p:spTree>
     <p:extLst>
       <p:ext uri="{BB962C8B-B14F-4D97-AF65-F5344CB8AC3E}">
-        <p14:creationId xmlns:p14="http://schemas.microsoft.com/office/powerpoint/2010/main" val="2551920288"/>
+        <p14:creationId xmlns="" xmlns:p14="http://schemas.microsoft.com/office/powerpoint/2010/main" val="2551920288"/>
       </p:ext>
     </p:extLst>
   </p:cSld>
@@ -4415,7 +6771,284 @@
 </p:sld>
 </file>
 
-<file path=ppt/slides/slide5.xml><?xml version="1.0" encoding="utf-8"?>
+<file path=ppt/slides/slide7.xml><?xml version="1.0" encoding="utf-8"?>
+<p:sld xmlns:a="http://schemas.openxmlformats.org/drawingml/2006/main" xmlns:r="http://schemas.openxmlformats.org/officeDocument/2006/relationships" xmlns:p="http://schemas.openxmlformats.org/presentationml/2006/main">
+  <p:cSld>
+    <p:spTree>
+      <p:nvGrpSpPr>
+        <p:cNvPr id="1" name=""/>
+        <p:cNvGrpSpPr/>
+        <p:nvPr/>
+      </p:nvGrpSpPr>
+      <p:grpSpPr>
+        <a:xfrm>
+          <a:off x="0" y="0"/>
+          <a:ext cx="0" cy="0"/>
+          <a:chOff x="0" y="0"/>
+          <a:chExt cx="0" cy="0"/>
+        </a:xfrm>
+      </p:grpSpPr>
+      <p:grpSp>
+        <p:nvGrpSpPr>
+          <p:cNvPr id="9" name="Group 8"/>
+          <p:cNvGrpSpPr/>
+          <p:nvPr/>
+        </p:nvGrpSpPr>
+        <p:grpSpPr>
+          <a:xfrm>
+            <a:off x="147145" y="355107"/>
+            <a:ext cx="2675538" cy="382087"/>
+            <a:chOff x="147145" y="355107"/>
+            <a:chExt cx="2675538" cy="382087"/>
+          </a:xfrm>
+        </p:grpSpPr>
+        <p:sp>
+          <p:nvSpPr>
+            <p:cNvPr id="6" name="TextBox 5">
+              <a:extLst>
+                <a:ext uri="{FF2B5EF4-FFF2-40B4-BE49-F238E27FC236}">
+                  <a16:creationId xmlns="" xmlns:a16="http://schemas.microsoft.com/office/drawing/2014/main" id="{781233F3-E30F-4EEA-AA0B-BF294238B536}"/>
+                </a:ext>
+              </a:extLst>
+            </p:cNvPr>
+            <p:cNvSpPr txBox="1"/>
+            <p:nvPr/>
+          </p:nvSpPr>
+          <p:spPr>
+            <a:xfrm>
+              <a:off x="557963" y="355107"/>
+              <a:ext cx="1528290" cy="369332"/>
+            </a:xfrm>
+            <a:prstGeom prst="rect">
+              <a:avLst/>
+            </a:prstGeom>
+            <a:solidFill>
+              <a:schemeClr val="tx1">
+                <a:lumMod val="65000"/>
+                <a:lumOff val="35000"/>
+              </a:schemeClr>
+            </a:solidFill>
+          </p:spPr>
+          <p:txBody>
+            <a:bodyPr wrap="square" rtlCol="0">
+              <a:spAutoFit/>
+            </a:bodyPr>
+            <a:lstStyle/>
+            <a:p>
+              <a:r>
+                <a:rPr lang="en-US" dirty="0">
+                  <a:solidFill>
+                    <a:schemeClr val="bg1"/>
+                  </a:solidFill>
+                </a:rPr>
+                <a:t>gbuser111111</a:t>
+              </a:r>
+            </a:p>
+          </p:txBody>
+        </p:sp>
+        <p:sp>
+          <p:nvSpPr>
+            <p:cNvPr id="7" name="TextBox 6">
+              <a:extLst>
+                <a:ext uri="{FF2B5EF4-FFF2-40B4-BE49-F238E27FC236}">
+                  <a16:creationId xmlns="" xmlns:a16="http://schemas.microsoft.com/office/drawing/2014/main" id="{70F34349-423A-4115-84D8-416509751460}"/>
+                </a:ext>
+              </a:extLst>
+            </p:cNvPr>
+            <p:cNvSpPr txBox="1"/>
+            <p:nvPr/>
+          </p:nvSpPr>
+          <p:spPr>
+            <a:xfrm>
+              <a:off x="2175029" y="363985"/>
+              <a:ext cx="184731" cy="369332"/>
+            </a:xfrm>
+            <a:prstGeom prst="rect">
+              <a:avLst/>
+            </a:prstGeom>
+            <a:noFill/>
+          </p:spPr>
+          <p:txBody>
+            <a:bodyPr wrap="none" rtlCol="0">
+              <a:spAutoFit/>
+            </a:bodyPr>
+            <a:lstStyle/>
+            <a:p>
+              <a:endParaRPr lang="en-US" dirty="0"/>
+            </a:p>
+          </p:txBody>
+        </p:sp>
+        <p:sp>
+          <p:nvSpPr>
+            <p:cNvPr id="12" name="TextBox 11"/>
+            <p:cNvSpPr txBox="1"/>
+            <p:nvPr/>
+          </p:nvSpPr>
+          <p:spPr>
+            <a:xfrm>
+              <a:off x="147145" y="367861"/>
+              <a:ext cx="359394" cy="369332"/>
+            </a:xfrm>
+            <a:prstGeom prst="rect">
+              <a:avLst/>
+            </a:prstGeom>
+            <a:noFill/>
+          </p:spPr>
+          <p:txBody>
+            <a:bodyPr wrap="none" rtlCol="0">
+              <a:spAutoFit/>
+            </a:bodyPr>
+            <a:lstStyle/>
+            <a:p>
+              <a:r>
+                <a:rPr lang="en-IN" dirty="0" smtClean="0"/>
+                <a:t>3.</a:t>
+              </a:r>
+              <a:endParaRPr lang="en-US" dirty="0"/>
+            </a:p>
+          </p:txBody>
+        </p:sp>
+        <p:sp>
+          <p:nvSpPr>
+            <p:cNvPr id="8" name="TextBox 7"/>
+            <p:cNvSpPr txBox="1"/>
+            <p:nvPr/>
+          </p:nvSpPr>
+          <p:spPr>
+            <a:xfrm>
+              <a:off x="2165131" y="367862"/>
+              <a:ext cx="657552" cy="369332"/>
+            </a:xfrm>
+            <a:prstGeom prst="rect">
+              <a:avLst/>
+            </a:prstGeom>
+            <a:noFill/>
+          </p:spPr>
+          <p:txBody>
+            <a:bodyPr wrap="none" rtlCol="0">
+              <a:spAutoFit/>
+            </a:bodyPr>
+            <a:lstStyle/>
+            <a:p>
+              <a:r>
+                <a:rPr lang="en-IN" dirty="0" smtClean="0"/>
+                <a:t>plays</a:t>
+              </a:r>
+              <a:endParaRPr lang="en-US" dirty="0"/>
+            </a:p>
+          </p:txBody>
+        </p:sp>
+      </p:grpSp>
+      <p:sp>
+        <p:nvSpPr>
+          <p:cNvPr id="10" name="TextBox 9"/>
+          <p:cNvSpPr txBox="1"/>
+          <p:nvPr/>
+        </p:nvSpPr>
+        <p:spPr>
+          <a:xfrm>
+            <a:off x="956441" y="1439913"/>
+            <a:ext cx="495841" cy="369332"/>
+          </a:xfrm>
+          <a:prstGeom prst="rect">
+            <a:avLst/>
+          </a:prstGeom>
+          <a:solidFill>
+            <a:srgbClr val="FFC000"/>
+          </a:solidFill>
+        </p:spPr>
+        <p:txBody>
+          <a:bodyPr wrap="none" rtlCol="0">
+            <a:spAutoFit/>
+          </a:bodyPr>
+          <a:lstStyle/>
+          <a:p>
+            <a:r>
+              <a:rPr lang="en-IN" dirty="0" smtClean="0"/>
+              <a:t>Pre</a:t>
+            </a:r>
+            <a:endParaRPr lang="en-US" dirty="0"/>
+          </a:p>
+        </p:txBody>
+      </p:sp>
+      <p:sp>
+        <p:nvSpPr>
+          <p:cNvPr id="11" name="TextBox 10"/>
+          <p:cNvSpPr txBox="1"/>
+          <p:nvPr/>
+        </p:nvSpPr>
+        <p:spPr>
+          <a:xfrm>
+            <a:off x="9212317" y="1476704"/>
+            <a:ext cx="584647" cy="369332"/>
+          </a:xfrm>
+          <a:prstGeom prst="rect">
+            <a:avLst/>
+          </a:prstGeom>
+          <a:solidFill>
+            <a:schemeClr val="accent1"/>
+          </a:solidFill>
+        </p:spPr>
+        <p:txBody>
+          <a:bodyPr wrap="none" rtlCol="0">
+            <a:spAutoFit/>
+          </a:bodyPr>
+          <a:lstStyle/>
+          <a:p>
+            <a:r>
+              <a:rPr lang="en-IN" dirty="0" smtClean="0"/>
+              <a:t>Post</a:t>
+            </a:r>
+            <a:endParaRPr lang="en-US" dirty="0"/>
+          </a:p>
+        </p:txBody>
+      </p:sp>
+      <p:sp>
+        <p:nvSpPr>
+          <p:cNvPr id="13" name="TextBox 12"/>
+          <p:cNvSpPr txBox="1"/>
+          <p:nvPr/>
+        </p:nvSpPr>
+        <p:spPr>
+          <a:xfrm>
+            <a:off x="4939862" y="1481959"/>
+            <a:ext cx="883575" cy="369332"/>
+          </a:xfrm>
+          <a:prstGeom prst="rect">
+            <a:avLst/>
+          </a:prstGeom>
+          <a:solidFill>
+            <a:schemeClr val="accent6"/>
+          </a:solidFill>
+        </p:spPr>
+        <p:txBody>
+          <a:bodyPr wrap="none" rtlCol="0">
+            <a:spAutoFit/>
+          </a:bodyPr>
+          <a:lstStyle/>
+          <a:p>
+            <a:r>
+              <a:rPr lang="en-IN" dirty="0" smtClean="0"/>
+              <a:t>Activity</a:t>
+            </a:r>
+            <a:endParaRPr lang="en-US" dirty="0"/>
+          </a:p>
+        </p:txBody>
+      </p:sp>
+    </p:spTree>
+    <p:extLst>
+      <p:ext uri="{BB962C8B-B14F-4D97-AF65-F5344CB8AC3E}">
+        <p14:creationId xmlns="" xmlns:p14="http://schemas.microsoft.com/office/powerpoint/2010/main" val="2551920288"/>
+      </p:ext>
+    </p:extLst>
+  </p:cSld>
+  <p:clrMapOvr>
+    <a:masterClrMapping/>
+  </p:clrMapOvr>
+</p:sld>
+</file>
+
+<file path=ppt/slides/slide8.xml><?xml version="1.0" encoding="utf-8"?>
 <p:sld xmlns:a="http://schemas.openxmlformats.org/drawingml/2006/main" xmlns:r="http://schemas.openxmlformats.org/officeDocument/2006/relationships" xmlns:p="http://schemas.openxmlformats.org/presentationml/2006/main" showMasterSp="0">
   <p:cSld>
     <p:spTree>
@@ -4437,7 +7070,7 @@
           <p:cNvPr id="2" name="Title 1">
             <a:extLst>
               <a:ext uri="{FF2B5EF4-FFF2-40B4-BE49-F238E27FC236}">
-                <a16:creationId xmlns:a16="http://schemas.microsoft.com/office/drawing/2014/main" id="{98DB85A8-ABB9-45CC-A155-6FA9AFD624C1}"/>
+                <a16:creationId xmlns="" xmlns:a16="http://schemas.microsoft.com/office/drawing/2014/main" id="{98DB85A8-ABB9-45CC-A155-6FA9AFD624C1}"/>
               </a:ext>
             </a:extLst>
           </p:cNvPr>
@@ -4472,7 +7105,7 @@
     </p:spTree>
     <p:extLst>
       <p:ext uri="{BB962C8B-B14F-4D97-AF65-F5344CB8AC3E}">
-        <p14:creationId xmlns:p14="http://schemas.microsoft.com/office/powerpoint/2010/main" val="2717991319"/>
+        <p14:creationId xmlns="" xmlns:p14="http://schemas.microsoft.com/office/powerpoint/2010/main" val="2717991319"/>
       </p:ext>
     </p:extLst>
   </p:cSld>
@@ -4525,7 +7158,7 @@
     </a:clrScheme>
     <a:fontScheme name="Retrospect">
       <a:majorFont>
-        <a:latin typeface="Calibri Light" panose="020F0302020204030204"/>
+        <a:latin typeface="Calibri Light"/>
         <a:ea typeface=""/>
         <a:cs typeface=""/>
         <a:font script="Jpan" typeface="ＭＳ Ｐゴシック"/>
@@ -4560,7 +7193,7 @@
         <a:font script="Geor" typeface="Sylfaen"/>
       </a:majorFont>
       <a:minorFont>
-        <a:latin typeface="Calibri" panose="020F0502020204030204"/>
+        <a:latin typeface="Calibri"/>
         <a:ea typeface=""/>
         <a:cs typeface=""/>
         <a:font script="Jpan" typeface="ＭＳ Ｐゴシック"/>
@@ -4759,7 +7392,7 @@
   <a:extraClrSchemeLst/>
   <a:extLst>
     <a:ext uri="{05A4C25C-085E-4340-85A3-A5531E510DB2}">
-      <thm15:themeFamily xmlns:thm15="http://schemas.microsoft.com/office/thememl/2012/main" name="Retrospect" id="{5F128B03-DCCA-4EEB-AB3B-CF2899314A46}" vid="{D26EA377-59BD-4C9C-9D94-EE8416EE4C79}"/>
+      <thm15:themeFamily xmlns="" xmlns:thm15="http://schemas.microsoft.com/office/thememl/2012/main" name="Retrospect" id="{5F128B03-DCCA-4EEB-AB3B-CF2899314A46}" vid="{D26EA377-59BD-4C9C-9D94-EE8416EE4C79}"/>
     </a:ext>
   </a:extLst>
 </a:theme>

</xml_diff>